<commit_message>
added basic presentation outline
</commit_message>
<xml_diff>
--- a/presentation/presentation.pptx
+++ b/presentation/presentation.pptx
@@ -5,39 +5,44 @@
     <p:sldMasterId id="2147483777" r:id="rId1"/>
   </p:sldMasterIdLst>
   <p:notesMasterIdLst>
-    <p:notesMasterId r:id="rId6"/>
+    <p:notesMasterId r:id="rId11"/>
   </p:notesMasterIdLst>
   <p:sldIdLst>
     <p:sldId id="256" r:id="rId2"/>
-    <p:sldId id="299" r:id="rId3"/>
-    <p:sldId id="300" r:id="rId4"/>
-    <p:sldId id="298" r:id="rId5"/>
+    <p:sldId id="301" r:id="rId3"/>
+    <p:sldId id="302" r:id="rId4"/>
+    <p:sldId id="303" r:id="rId5"/>
+    <p:sldId id="300" r:id="rId6"/>
+    <p:sldId id="304" r:id="rId7"/>
+    <p:sldId id="306" r:id="rId8"/>
+    <p:sldId id="305" r:id="rId9"/>
+    <p:sldId id="298" r:id="rId10"/>
   </p:sldIdLst>
   <p:sldSz cx="12192000" cy="6858000"/>
   <p:notesSz cx="6858000" cy="9144000"/>
   <p:embeddedFontLst>
     <p:embeddedFont>
       <p:font typeface="Calibri" panose="020F0502020204030204" pitchFamily="34" charset="0"/>
-      <p:regular r:id="rId7"/>
-      <p:bold r:id="rId8"/>
-      <p:italic r:id="rId9"/>
-      <p:boldItalic r:id="rId10"/>
+      <p:regular r:id="rId12"/>
+      <p:bold r:id="rId13"/>
+      <p:italic r:id="rId14"/>
+      <p:boldItalic r:id="rId15"/>
     </p:embeddedFont>
     <p:embeddedFont>
       <p:font typeface="Century Gothic" panose="020B0502020202020204" pitchFamily="34" charset="0"/>
-      <p:regular r:id="rId11"/>
-      <p:bold r:id="rId12"/>
-      <p:italic r:id="rId13"/>
-      <p:boldItalic r:id="rId14"/>
+      <p:regular r:id="rId16"/>
+      <p:bold r:id="rId17"/>
+      <p:italic r:id="rId18"/>
+      <p:boldItalic r:id="rId19"/>
     </p:embeddedFont>
     <p:embeddedFont>
-      <p:font typeface="Roboto Light" panose="02000000000000000000" pitchFamily="2" charset="0"/>
-      <p:regular r:id="rId15"/>
-      <p:italic r:id="rId16"/>
+      <p:font typeface="Roboto Light" panose="020B0604020202020204" charset="0"/>
+      <p:regular r:id="rId20"/>
+      <p:italic r:id="rId21"/>
     </p:embeddedFont>
   </p:embeddedFontLst>
   <p:custDataLst>
-    <p:tags r:id="rId17"/>
+    <p:tags r:id="rId22"/>
   </p:custDataLst>
   <p:defaultTextStyle>
     <a:defPPr>
@@ -172,9 +177,11 @@
             <p14:sldId id="256"/>
           </p14:sldIdLst>
         </p14:section>
-        <p14:section name="Intro" id="{A1932946-13DA-478C-B6BB-4C7CADDB0DF9}">
+        <p14:section name="Hyperparameter Optimization" id="{857B1FB8-DA0F-4FF9-800F-C9C002992671}">
           <p14:sldIdLst>
-            <p14:sldId id="299"/>
+            <p14:sldId id="301"/>
+            <p14:sldId id="302"/>
+            <p14:sldId id="303"/>
           </p14:sldIdLst>
         </p14:section>
         <p14:section name="Fabolas" id="{FF98FBB9-E38C-48CF-9A75-50A2367ED08C}">
@@ -183,7 +190,15 @@
           </p14:sldIdLst>
         </p14:section>
         <p14:section name="Learning Curve Extrapolation" id="{98804AAA-4943-4B4B-9240-2B82157567A0}">
-          <p14:sldIdLst/>
+          <p14:sldIdLst>
+            <p14:sldId id="304"/>
+          </p14:sldIdLst>
+        </p14:section>
+        <p14:section name="Optimizing Training" id="{D251C17E-6A51-4177-85A7-17783EB0FE19}">
+          <p14:sldIdLst>
+            <p14:sldId id="306"/>
+            <p14:sldId id="305"/>
+          </p14:sldIdLst>
         </p14:section>
         <p14:section name="BLB" id="{2DADDE32-E617-4B32-B5BA-A23D7D1A8D00}">
           <p14:sldIdLst/>
@@ -784,9 +799,34 @@
           </a:lstStyle>
           <a:p>
             <a:r>
-              <a:rPr lang="en-US" noProof="0"/>
-              <a:t>Titelmasterformat durch Klicken bearbeiten</a:t>
-            </a:r>
+              <a:rPr lang="en-US" noProof="0" dirty="0" err="1"/>
+              <a:t>Titelmasterformat</a:t>
+            </a:r>
+            <a:r>
+              <a:rPr lang="en-US" noProof="0" dirty="0"/>
+              <a:t> </a:t>
+            </a:r>
+            <a:r>
+              <a:rPr lang="en-US" noProof="0" dirty="0" err="1"/>
+              <a:t>durch</a:t>
+            </a:r>
+            <a:r>
+              <a:rPr lang="en-US" noProof="0" dirty="0"/>
+              <a:t> </a:t>
+            </a:r>
+            <a:r>
+              <a:rPr lang="en-US" noProof="0" dirty="0" err="1"/>
+              <a:t>Klicken</a:t>
+            </a:r>
+            <a:r>
+              <a:rPr lang="en-US" noProof="0" dirty="0"/>
+              <a:t> </a:t>
+            </a:r>
+            <a:r>
+              <a:rPr lang="en-US" noProof="0" dirty="0" err="1"/>
+              <a:t>bearbeiten</a:t>
+            </a:r>
+            <a:endParaRPr lang="en-US" noProof="0" dirty="0"/>
           </a:p>
         </p:txBody>
       </p:sp>
@@ -851,9 +891,42 @@
           </a:lstStyle>
           <a:p>
             <a:r>
-              <a:rPr lang="en-US" noProof="0"/>
-              <a:t>Formatvorlage des Untertitelmasters durch Klicken bearbeiten</a:t>
-            </a:r>
+              <a:rPr lang="en-US" noProof="0" dirty="0" err="1"/>
+              <a:t>Formatvorlage</a:t>
+            </a:r>
+            <a:r>
+              <a:rPr lang="en-US" noProof="0" dirty="0"/>
+              <a:t> des </a:t>
+            </a:r>
+            <a:r>
+              <a:rPr lang="en-US" noProof="0" dirty="0" err="1"/>
+              <a:t>Untertitelmasters</a:t>
+            </a:r>
+            <a:r>
+              <a:rPr lang="en-US" noProof="0" dirty="0"/>
+              <a:t> </a:t>
+            </a:r>
+            <a:r>
+              <a:rPr lang="en-US" noProof="0" dirty="0" err="1"/>
+              <a:t>durch</a:t>
+            </a:r>
+            <a:r>
+              <a:rPr lang="en-US" noProof="0" dirty="0"/>
+              <a:t> </a:t>
+            </a:r>
+            <a:r>
+              <a:rPr lang="en-US" noProof="0" dirty="0" err="1"/>
+              <a:t>Klicken</a:t>
+            </a:r>
+            <a:r>
+              <a:rPr lang="en-US" noProof="0" dirty="0"/>
+              <a:t> </a:t>
+            </a:r>
+            <a:r>
+              <a:rPr lang="en-US" noProof="0" dirty="0" err="1"/>
+              <a:t>bearbeiten</a:t>
+            </a:r>
+            <a:endParaRPr lang="en-US" noProof="0" dirty="0"/>
           </a:p>
         </p:txBody>
       </p:sp>
@@ -1032,7 +1105,7 @@
             <a:spLocks noGrp="1"/>
           </p:cNvSpPr>
           <p:nvPr>
-            <p:ph idx="1"/>
+            <p:ph idx="1" hasCustomPrompt="1"/>
           </p:nvPr>
         </p:nvSpPr>
         <p:spPr/>
@@ -1042,38 +1115,37 @@
           <a:p>
             <a:pPr lvl="0"/>
             <a:r>
-              <a:rPr lang="de-DE"/>
+              <a:rPr lang="en-US" noProof="0"/>
               <a:t>Textmasterformat bearbeiten</a:t>
             </a:r>
           </a:p>
           <a:p>
             <a:pPr lvl="1"/>
             <a:r>
-              <a:rPr lang="de-DE"/>
+              <a:rPr lang="en-US" noProof="0"/>
               <a:t>Zweite Ebene</a:t>
             </a:r>
           </a:p>
           <a:p>
             <a:pPr lvl="2"/>
             <a:r>
-              <a:rPr lang="de-DE"/>
+              <a:rPr lang="en-US" noProof="0"/>
               <a:t>Dritte Ebene</a:t>
             </a:r>
           </a:p>
           <a:p>
             <a:pPr lvl="3"/>
             <a:r>
-              <a:rPr lang="de-DE"/>
+              <a:rPr lang="en-US" noProof="0"/>
               <a:t>Vierte Ebene</a:t>
             </a:r>
           </a:p>
           <a:p>
             <a:pPr lvl="4"/>
             <a:r>
-              <a:rPr lang="de-DE"/>
+              <a:rPr lang="en-US" noProof="0"/>
               <a:t>Fünfte Ebene</a:t>
             </a:r>
-            <a:endParaRPr lang="de-DE" dirty="0"/>
           </a:p>
         </p:txBody>
       </p:sp>
@@ -1151,7 +1223,7 @@
             <a:spLocks noGrp="1"/>
           </p:cNvSpPr>
           <p:nvPr>
-            <p:ph type="title"/>
+            <p:ph type="title" hasCustomPrompt="1"/>
           </p:nvPr>
         </p:nvSpPr>
         <p:spPr>
@@ -1170,10 +1242,9 @@
           <a:lstStyle/>
           <a:p>
             <a:r>
-              <a:rPr lang="de-DE"/>
+              <a:rPr lang="en-US" noProof="0"/>
               <a:t>Titelmasterformat durch Klicken bearbeiten</a:t>
             </a:r>
-            <a:endParaRPr lang="de-DE" dirty="0"/>
           </a:p>
         </p:txBody>
       </p:sp>
@@ -1214,7 +1285,7 @@
             <a:spLocks noGrp="1"/>
           </p:cNvSpPr>
           <p:nvPr>
-            <p:ph type="title"/>
+            <p:ph type="title" hasCustomPrompt="1"/>
           </p:nvPr>
         </p:nvSpPr>
         <p:spPr>
@@ -1235,9 +1306,34 @@
           </a:lstStyle>
           <a:p>
             <a:r>
-              <a:rPr lang="de-DE"/>
-              <a:t>Titelmasterformat durch Klicken bearbeiten</a:t>
-            </a:r>
+              <a:rPr lang="en-US" noProof="0" dirty="0" err="1"/>
+              <a:t>Titelmasterformat</a:t>
+            </a:r>
+            <a:r>
+              <a:rPr lang="en-US" noProof="0" dirty="0"/>
+              <a:t> </a:t>
+            </a:r>
+            <a:r>
+              <a:rPr lang="en-US" noProof="0" dirty="0" err="1"/>
+              <a:t>durch</a:t>
+            </a:r>
+            <a:r>
+              <a:rPr lang="en-US" noProof="0" dirty="0"/>
+              <a:t> </a:t>
+            </a:r>
+            <a:r>
+              <a:rPr lang="en-US" noProof="0" dirty="0" err="1"/>
+              <a:t>Klicken</a:t>
+            </a:r>
+            <a:r>
+              <a:rPr lang="en-US" noProof="0" dirty="0"/>
+              <a:t> </a:t>
+            </a:r>
+            <a:r>
+              <a:rPr lang="en-US" noProof="0" dirty="0" err="1"/>
+              <a:t>bearbeiten</a:t>
+            </a:r>
+            <a:endParaRPr lang="en-US" noProof="0" dirty="0"/>
           </a:p>
         </p:txBody>
       </p:sp>
@@ -1248,7 +1344,7 @@
             <a:spLocks noGrp="1"/>
           </p:cNvSpPr>
           <p:nvPr>
-            <p:ph type="body" idx="1"/>
+            <p:ph type="body" idx="1" hasCustomPrompt="1"/>
           </p:nvPr>
         </p:nvSpPr>
         <p:spPr>
@@ -1354,8 +1450,12 @@
           <a:p>
             <a:pPr lvl="0"/>
             <a:r>
-              <a:rPr lang="de-DE"/>
-              <a:t>Textmasterformat bearbeiten</a:t>
+              <a:rPr lang="en-US" noProof="0" dirty="0" err="1"/>
+              <a:t>Textmasterformat</a:t>
+            </a:r>
+            <a:r>
+              <a:rPr lang="de-DE" dirty="0"/>
+              <a:t> bearbeiten</a:t>
             </a:r>
           </a:p>
         </p:txBody>
@@ -1464,7 +1564,7 @@
             <a:spLocks noGrp="1"/>
           </p:cNvSpPr>
           <p:nvPr>
-            <p:ph sz="half" idx="1"/>
+            <p:ph sz="half" idx="1" hasCustomPrompt="1"/>
           </p:nvPr>
         </p:nvSpPr>
         <p:spPr>
@@ -1479,35 +1579,35 @@
           <a:p>
             <a:pPr lvl="0"/>
             <a:r>
-              <a:rPr lang="de-DE"/>
+              <a:rPr lang="en-US" noProof="0"/>
               <a:t>Textmasterformat bearbeiten</a:t>
             </a:r>
           </a:p>
           <a:p>
             <a:pPr lvl="1"/>
             <a:r>
-              <a:rPr lang="de-DE"/>
+              <a:rPr lang="en-US" noProof="0"/>
               <a:t>Zweite Ebene</a:t>
             </a:r>
           </a:p>
           <a:p>
             <a:pPr lvl="2"/>
             <a:r>
-              <a:rPr lang="de-DE"/>
+              <a:rPr lang="en-US" noProof="0"/>
               <a:t>Dritte Ebene</a:t>
             </a:r>
           </a:p>
           <a:p>
             <a:pPr lvl="3"/>
             <a:r>
-              <a:rPr lang="de-DE"/>
+              <a:rPr lang="en-US" noProof="0"/>
               <a:t>Vierte Ebene</a:t>
             </a:r>
           </a:p>
           <a:p>
             <a:pPr lvl="4"/>
             <a:r>
-              <a:rPr lang="de-DE"/>
+              <a:rPr lang="en-US" noProof="0"/>
               <a:t>Fünfte Ebene</a:t>
             </a:r>
           </a:p>
@@ -1520,7 +1620,7 @@
             <a:spLocks noGrp="1"/>
           </p:cNvSpPr>
           <p:nvPr>
-            <p:ph sz="half" idx="2"/>
+            <p:ph sz="half" idx="2" hasCustomPrompt="1"/>
           </p:nvPr>
         </p:nvSpPr>
         <p:spPr>
@@ -1535,35 +1635,35 @@
           <a:p>
             <a:pPr lvl="0"/>
             <a:r>
-              <a:rPr lang="de-DE"/>
+              <a:rPr lang="en-US" noProof="0"/>
               <a:t>Textmasterformat bearbeiten</a:t>
             </a:r>
           </a:p>
           <a:p>
             <a:pPr lvl="1"/>
             <a:r>
-              <a:rPr lang="de-DE"/>
+              <a:rPr lang="en-US" noProof="0"/>
               <a:t>Zweite Ebene</a:t>
             </a:r>
           </a:p>
           <a:p>
             <a:pPr lvl="2"/>
             <a:r>
-              <a:rPr lang="de-DE"/>
+              <a:rPr lang="en-US" noProof="0"/>
               <a:t>Dritte Ebene</a:t>
             </a:r>
           </a:p>
           <a:p>
             <a:pPr lvl="3"/>
             <a:r>
-              <a:rPr lang="de-DE"/>
+              <a:rPr lang="en-US" noProof="0"/>
               <a:t>Vierte Ebene</a:t>
             </a:r>
           </a:p>
           <a:p>
             <a:pPr lvl="4"/>
             <a:r>
-              <a:rPr lang="de-DE"/>
+              <a:rPr lang="en-US" noProof="0"/>
               <a:t>Fünfte Ebene</a:t>
             </a:r>
           </a:p>
@@ -1643,7 +1743,7 @@
             <a:spLocks noGrp="1"/>
           </p:cNvSpPr>
           <p:nvPr>
-            <p:ph type="title"/>
+            <p:ph type="title" hasCustomPrompt="1"/>
           </p:nvPr>
         </p:nvSpPr>
         <p:spPr>
@@ -1662,10 +1762,9 @@
           <a:lstStyle/>
           <a:p>
             <a:r>
-              <a:rPr lang="de-DE"/>
+              <a:rPr lang="en-US" noProof="0"/>
               <a:t>Titelmasterformat durch Klicken bearbeiten</a:t>
             </a:r>
-            <a:endParaRPr lang="de-DE" dirty="0"/>
           </a:p>
         </p:txBody>
       </p:sp>
@@ -1706,7 +1805,7 @@
             <a:spLocks noGrp="1"/>
           </p:cNvSpPr>
           <p:nvPr>
-            <p:ph type="body" idx="1"/>
+            <p:ph type="body" idx="1" hasCustomPrompt="1"/>
           </p:nvPr>
         </p:nvSpPr>
         <p:spPr>
@@ -1758,7 +1857,7 @@
           <a:p>
             <a:pPr lvl="0"/>
             <a:r>
-              <a:rPr lang="de-DE"/>
+              <a:rPr lang="en-US" noProof="0"/>
               <a:t>Textmasterformat bearbeiten</a:t>
             </a:r>
           </a:p>
@@ -1771,7 +1870,7 @@
             <a:spLocks noGrp="1"/>
           </p:cNvSpPr>
           <p:nvPr>
-            <p:ph sz="half" idx="2"/>
+            <p:ph sz="half" idx="2" hasCustomPrompt="1"/>
           </p:nvPr>
         </p:nvSpPr>
         <p:spPr>
@@ -1786,35 +1885,35 @@
           <a:p>
             <a:pPr lvl="0"/>
             <a:r>
-              <a:rPr lang="de-DE"/>
+              <a:rPr lang="en-US" noProof="0"/>
               <a:t>Textmasterformat bearbeiten</a:t>
             </a:r>
           </a:p>
           <a:p>
             <a:pPr lvl="1"/>
             <a:r>
-              <a:rPr lang="de-DE"/>
+              <a:rPr lang="en-US" noProof="0"/>
               <a:t>Zweite Ebene</a:t>
             </a:r>
           </a:p>
           <a:p>
             <a:pPr lvl="2"/>
             <a:r>
-              <a:rPr lang="de-DE"/>
+              <a:rPr lang="en-US" noProof="0"/>
               <a:t>Dritte Ebene</a:t>
             </a:r>
           </a:p>
           <a:p>
             <a:pPr lvl="3"/>
             <a:r>
-              <a:rPr lang="de-DE"/>
+              <a:rPr lang="en-US" noProof="0"/>
               <a:t>Vierte Ebene</a:t>
             </a:r>
           </a:p>
           <a:p>
             <a:pPr lvl="4"/>
             <a:r>
-              <a:rPr lang="de-DE"/>
+              <a:rPr lang="en-US" noProof="0"/>
               <a:t>Fünfte Ebene</a:t>
             </a:r>
           </a:p>
@@ -1827,7 +1926,7 @@
             <a:spLocks noGrp="1"/>
           </p:cNvSpPr>
           <p:nvPr>
-            <p:ph type="body" sz="quarter" idx="3"/>
+            <p:ph type="body" sz="quarter" idx="3" hasCustomPrompt="1"/>
           </p:nvPr>
         </p:nvSpPr>
         <p:spPr>
@@ -1879,7 +1978,7 @@
           <a:p>
             <a:pPr lvl="0"/>
             <a:r>
-              <a:rPr lang="de-DE"/>
+              <a:rPr lang="en-US" noProof="0"/>
               <a:t>Textmasterformat bearbeiten</a:t>
             </a:r>
           </a:p>
@@ -1892,7 +1991,7 @@
             <a:spLocks noGrp="1"/>
           </p:cNvSpPr>
           <p:nvPr>
-            <p:ph sz="quarter" idx="4"/>
+            <p:ph sz="quarter" idx="4" hasCustomPrompt="1"/>
           </p:nvPr>
         </p:nvSpPr>
         <p:spPr>
@@ -1907,35 +2006,35 @@
           <a:p>
             <a:pPr lvl="0"/>
             <a:r>
-              <a:rPr lang="de-DE"/>
+              <a:rPr lang="en-US" noProof="0"/>
               <a:t>Textmasterformat bearbeiten</a:t>
             </a:r>
           </a:p>
           <a:p>
             <a:pPr lvl="1"/>
             <a:r>
-              <a:rPr lang="de-DE"/>
+              <a:rPr lang="en-US" noProof="0"/>
               <a:t>Zweite Ebene</a:t>
             </a:r>
           </a:p>
           <a:p>
             <a:pPr lvl="2"/>
             <a:r>
-              <a:rPr lang="de-DE"/>
+              <a:rPr lang="en-US" noProof="0"/>
               <a:t>Dritte Ebene</a:t>
             </a:r>
           </a:p>
           <a:p>
             <a:pPr lvl="3"/>
             <a:r>
-              <a:rPr lang="de-DE"/>
+              <a:rPr lang="en-US" noProof="0"/>
               <a:t>Vierte Ebene</a:t>
             </a:r>
           </a:p>
           <a:p>
             <a:pPr lvl="4"/>
             <a:r>
-              <a:rPr lang="de-DE"/>
+              <a:rPr lang="en-US" noProof="0"/>
               <a:t>Fünfte Ebene</a:t>
             </a:r>
           </a:p>
@@ -2015,7 +2114,7 @@
             <a:spLocks noGrp="1"/>
           </p:cNvSpPr>
           <p:nvPr>
-            <p:ph type="title"/>
+            <p:ph type="title" hasCustomPrompt="1"/>
           </p:nvPr>
         </p:nvSpPr>
         <p:spPr>
@@ -2034,10 +2133,9 @@
           <a:lstStyle/>
           <a:p>
             <a:r>
-              <a:rPr lang="de-DE"/>
+              <a:rPr lang="en-US" noProof="0"/>
               <a:t>Titelmasterformat durch Klicken bearbeiten</a:t>
             </a:r>
-            <a:endParaRPr lang="de-DE" dirty="0"/>
           </a:p>
         </p:txBody>
       </p:sp>
@@ -2078,7 +2176,7 @@
             <a:spLocks noGrp="1"/>
           </p:cNvSpPr>
           <p:nvPr>
-            <p:ph type="title"/>
+            <p:ph type="title" hasCustomPrompt="1"/>
           </p:nvPr>
         </p:nvSpPr>
         <p:spPr/>
@@ -2087,8 +2185,16 @@
           <a:lstStyle/>
           <a:p>
             <a:r>
-              <a:rPr lang="de-DE"/>
-              <a:t>Titelmasterformat durch Klicken bearbeiten</a:t>
+              <a:rPr lang="de-DE" dirty="0"/>
+              <a:t>Titelmasterformat </a:t>
+            </a:r>
+            <a:r>
+              <a:rPr lang="en-US" noProof="0" dirty="0" err="1"/>
+              <a:t>durch</a:t>
+            </a:r>
+            <a:r>
+              <a:rPr lang="de-DE" dirty="0"/>
+              <a:t> Klicken bearbeiten</a:t>
             </a:r>
           </a:p>
         </p:txBody>
@@ -2295,7 +2401,7 @@
             <a:spLocks noGrp="1"/>
           </p:cNvSpPr>
           <p:nvPr>
-            <p:ph type="title"/>
+            <p:ph type="title" hasCustomPrompt="1"/>
           </p:nvPr>
         </p:nvSpPr>
         <p:spPr>
@@ -2316,10 +2422,9 @@
           </a:lstStyle>
           <a:p>
             <a:r>
-              <a:rPr lang="de-DE"/>
+              <a:rPr lang="en-US" noProof="0"/>
               <a:t>Titelmasterformat durch Klicken bearbeiten</a:t>
             </a:r>
-            <a:endParaRPr lang="de-DE" dirty="0"/>
           </a:p>
         </p:txBody>
       </p:sp>
@@ -2330,7 +2435,7 @@
             <a:spLocks noGrp="1"/>
           </p:cNvSpPr>
           <p:nvPr>
-            <p:ph idx="1"/>
+            <p:ph idx="1" hasCustomPrompt="1"/>
           </p:nvPr>
         </p:nvSpPr>
         <p:spPr>
@@ -2373,38 +2478,37 @@
           <a:p>
             <a:pPr lvl="0"/>
             <a:r>
-              <a:rPr lang="de-DE"/>
+              <a:rPr lang="en-US" noProof="0"/>
               <a:t>Textmasterformat bearbeiten</a:t>
             </a:r>
           </a:p>
           <a:p>
             <a:pPr lvl="1"/>
             <a:r>
-              <a:rPr lang="de-DE"/>
+              <a:rPr lang="en-US" noProof="0"/>
               <a:t>Zweite Ebene</a:t>
             </a:r>
           </a:p>
           <a:p>
             <a:pPr lvl="2"/>
             <a:r>
-              <a:rPr lang="de-DE"/>
+              <a:rPr lang="en-US" noProof="0"/>
               <a:t>Dritte Ebene</a:t>
             </a:r>
           </a:p>
           <a:p>
             <a:pPr lvl="3"/>
             <a:r>
-              <a:rPr lang="de-DE"/>
+              <a:rPr lang="en-US" noProof="0"/>
               <a:t>Vierte Ebene</a:t>
             </a:r>
           </a:p>
           <a:p>
             <a:pPr lvl="4"/>
             <a:r>
-              <a:rPr lang="de-DE"/>
+              <a:rPr lang="en-US" noProof="0"/>
               <a:t>Fünfte Ebene</a:t>
             </a:r>
-            <a:endParaRPr lang="de-DE" dirty="0"/>
           </a:p>
         </p:txBody>
       </p:sp>
@@ -2415,7 +2519,7 @@
             <a:spLocks noGrp="1"/>
           </p:cNvSpPr>
           <p:nvPr>
-            <p:ph type="body" sz="half" idx="2"/>
+            <p:ph type="body" sz="half" idx="2" hasCustomPrompt="1"/>
           </p:nvPr>
         </p:nvSpPr>
         <p:spPr>
@@ -2467,7 +2571,7 @@
           <a:p>
             <a:pPr lvl="0"/>
             <a:r>
-              <a:rPr lang="de-DE"/>
+              <a:rPr lang="en-US" noProof="0"/>
               <a:t>Textmasterformat bearbeiten</a:t>
             </a:r>
           </a:p>
@@ -3353,10 +3457,10 @@
       </p:grpSpPr>
       <p:sp>
         <p:nvSpPr>
-          <p:cNvPr id="2" name="Inhaltsplatzhalter 1">
+          <p:cNvPr id="8" name="Inhaltsplatzhalter 7">
             <a:extLst>
               <a:ext uri="{FF2B5EF4-FFF2-40B4-BE49-F238E27FC236}">
-                <a16:creationId xmlns:a16="http://schemas.microsoft.com/office/drawing/2014/main" id="{759EBB0B-123B-4754-9F60-FDE1F37C54E2}"/>
+                <a16:creationId xmlns:a16="http://schemas.microsoft.com/office/drawing/2014/main" id="{60FD48A6-AEC9-491D-A1D4-17AC8AC102C5}"/>
               </a:ext>
             </a:extLst>
           </p:cNvPr>
@@ -3364,60 +3468,73 @@
             <a:spLocks noGrp="1"/>
           </p:cNvSpPr>
           <p:nvPr>
-            <p:ph sz="half" idx="1"/>
+            <p:ph idx="1"/>
           </p:nvPr>
         </p:nvSpPr>
         <p:spPr>
           <a:xfrm>
-            <a:off x="838200" y="2420888"/>
-            <a:ext cx="5156200" cy="3756075"/>
+            <a:off x="838200" y="1124745"/>
+            <a:ext cx="10515600" cy="4680520"/>
           </a:xfrm>
         </p:spPr>
         <p:txBody>
-          <a:bodyPr/>
+          <a:bodyPr anchor="ctr">
+            <a:normAutofit/>
+          </a:bodyPr>
           <a:lstStyle/>
           <a:p>
             <a:pPr marL="0" indent="0" algn="ctr">
               <a:lnSpc>
-                <a:spcPct val="150000"/>
+                <a:spcPct val="250000"/>
               </a:lnSpc>
+              <a:spcBef>
+                <a:spcPts val="0"/>
+              </a:spcBef>
               <a:buNone/>
             </a:pPr>
             <a:r>
               <a:rPr lang="en-US" b="1" dirty="0"/>
+              <a:t>Speedup via:</a:t>
+            </a:r>
+          </a:p>
+          <a:p>
+            <a:pPr marL="0" indent="0" algn="ctr">
+              <a:lnSpc>
+                <a:spcPct val="250000"/>
+              </a:lnSpc>
+              <a:spcBef>
+                <a:spcPts val="0"/>
+              </a:spcBef>
+              <a:buNone/>
+            </a:pPr>
+            <a:r>
+              <a:rPr lang="en-US" sz="3600" dirty="0"/>
               <a:t>Hyperparameter Optimization</a:t>
             </a:r>
           </a:p>
           <a:p>
-            <a:pPr>
+            <a:pPr marL="0" indent="0" algn="ctr">
               <a:lnSpc>
-                <a:spcPct val="150000"/>
+                <a:spcPct val="250000"/>
               </a:lnSpc>
+              <a:spcBef>
+                <a:spcPts val="0"/>
+              </a:spcBef>
+              <a:buNone/>
             </a:pPr>
             <a:r>
-              <a:rPr lang="en-US" sz="2400" dirty="0"/>
-              <a:t>Fabolas</a:t>
-            </a:r>
-          </a:p>
-          <a:p>
-            <a:pPr>
-              <a:lnSpc>
-                <a:spcPct val="150000"/>
-              </a:lnSpc>
-            </a:pPr>
-            <a:r>
-              <a:rPr lang="en-US" sz="2400" dirty="0"/>
-              <a:t>Learning Curve Extrapolation</a:t>
-            </a:r>
-          </a:p>
-        </p:txBody>
-      </p:sp>
-      <p:sp>
-        <p:nvSpPr>
-          <p:cNvPr id="3" name="Inhaltsplatzhalter 2">
+              <a:rPr lang="en-US" sz="3600" dirty="0"/>
+              <a:t>Optimizing Training</a:t>
+            </a:r>
+          </a:p>
+        </p:txBody>
+      </p:sp>
+      <p:sp>
+        <p:nvSpPr>
+          <p:cNvPr id="5" name="Datumsplatzhalter 4">
             <a:extLst>
               <a:ext uri="{FF2B5EF4-FFF2-40B4-BE49-F238E27FC236}">
-                <a16:creationId xmlns:a16="http://schemas.microsoft.com/office/drawing/2014/main" id="{D2118EBD-C773-4FAC-9FA9-B879851F6D7F}"/>
+                <a16:creationId xmlns:a16="http://schemas.microsoft.com/office/drawing/2014/main" id="{B5D02EDC-C20A-4838-8D2D-CE6B1E9CBA4A}"/>
               </a:ext>
             </a:extLst>
           </p:cNvPr>
@@ -3425,84 +3542,55 @@
             <a:spLocks noGrp="1"/>
           </p:cNvSpPr>
           <p:nvPr>
-            <p:ph sz="half" idx="2"/>
-          </p:nvPr>
-        </p:nvSpPr>
-        <p:spPr>
-          <a:xfrm>
-            <a:off x="6197600" y="2420888"/>
-            <a:ext cx="5156200" cy="3756075"/>
-          </a:xfrm>
-        </p:spPr>
-        <p:txBody>
-          <a:bodyPr>
-            <a:normAutofit fontScale="92500"/>
-          </a:bodyPr>
-          <a:lstStyle/>
-          <a:p>
-            <a:pPr marL="0" indent="0" algn="ctr">
-              <a:lnSpc>
-                <a:spcPct val="150000"/>
-              </a:lnSpc>
-              <a:buNone/>
-            </a:pPr>
-            <a:r>
-              <a:rPr lang="en-US" b="1" dirty="0"/>
-              <a:t>Optimizing Training</a:t>
-            </a:r>
-          </a:p>
-          <a:p>
-            <a:pPr>
-              <a:lnSpc>
-                <a:spcPct val="150000"/>
-              </a:lnSpc>
-            </a:pPr>
-            <a:r>
-              <a:rPr lang="en-US" sz="2400" dirty="0"/>
-              <a:t>BLB</a:t>
-            </a:r>
-          </a:p>
-          <a:p>
-            <a:pPr>
-              <a:lnSpc>
-                <a:spcPct val="150000"/>
-              </a:lnSpc>
-            </a:pPr>
-            <a:r>
-              <a:rPr lang="en-US" sz="2400" dirty="0"/>
-              <a:t>Gradient Descent Sample Size Selection</a:t>
-            </a:r>
-          </a:p>
-          <a:p>
-            <a:pPr>
-              <a:lnSpc>
-                <a:spcPct val="150000"/>
-              </a:lnSpc>
-            </a:pPr>
-            <a:r>
-              <a:rPr lang="en-US" sz="2400" dirty="0"/>
-              <a:t>Subsampling for Logistic Regression</a:t>
-            </a:r>
-          </a:p>
-          <a:p>
-            <a:pPr>
-              <a:lnSpc>
-                <a:spcPct val="150000"/>
-              </a:lnSpc>
-            </a:pPr>
-            <a:r>
-              <a:rPr lang="en-US" sz="2400" dirty="0"/>
-              <a:t>WKM-SVM</a:t>
-            </a:r>
-          </a:p>
-        </p:txBody>
-      </p:sp>
-      <p:sp>
-        <p:nvSpPr>
-          <p:cNvPr id="4" name="Foliennummernplatzhalter 3">
+            <p:ph type="dt" sz="half" idx="10"/>
+          </p:nvPr>
+        </p:nvSpPr>
+        <p:spPr/>
+        <p:txBody>
+          <a:bodyPr/>
+          <a:lstStyle/>
+          <a:p>
+            <a:r>
+              <a:rPr lang="de-DE" dirty="0"/>
+              <a:t>28.11.2018</a:t>
+            </a:r>
+          </a:p>
+        </p:txBody>
+      </p:sp>
+      <p:sp>
+        <p:nvSpPr>
+          <p:cNvPr id="6" name="Fußzeilenplatzhalter 5">
             <a:extLst>
               <a:ext uri="{FF2B5EF4-FFF2-40B4-BE49-F238E27FC236}">
-                <a16:creationId xmlns:a16="http://schemas.microsoft.com/office/drawing/2014/main" id="{E575FB1B-64C6-407B-92A1-01182208845A}"/>
+                <a16:creationId xmlns:a16="http://schemas.microsoft.com/office/drawing/2014/main" id="{D815E852-3B76-42B9-95D2-C201A6A702F6}"/>
+              </a:ext>
+            </a:extLst>
+          </p:cNvPr>
+          <p:cNvSpPr>
+            <a:spLocks noGrp="1"/>
+          </p:cNvSpPr>
+          <p:nvPr>
+            <p:ph type="ftr" sz="quarter" idx="11"/>
+          </p:nvPr>
+        </p:nvSpPr>
+        <p:spPr/>
+        <p:txBody>
+          <a:bodyPr/>
+          <a:lstStyle/>
+          <a:p>
+            <a:r>
+              <a:rPr lang="en-US" dirty="0"/>
+              <a:t>Classification in Big Data Environments</a:t>
+            </a:r>
+          </a:p>
+        </p:txBody>
+      </p:sp>
+      <p:sp>
+        <p:nvSpPr>
+          <p:cNvPr id="7" name="Foliennummernplatzhalter 6">
+            <a:extLst>
+              <a:ext uri="{FF2B5EF4-FFF2-40B4-BE49-F238E27FC236}">
+                <a16:creationId xmlns:a16="http://schemas.microsoft.com/office/drawing/2014/main" id="{FFB95A85-EF0D-4093-8AF7-76A5616378CD}"/>
               </a:ext>
             </a:extLst>
           </p:cNvPr>
@@ -3528,10 +3616,10 @@
       </p:sp>
       <p:sp>
         <p:nvSpPr>
-          <p:cNvPr id="5" name="Titel 4">
+          <p:cNvPr id="2" name="Titel 1">
             <a:extLst>
               <a:ext uri="{FF2B5EF4-FFF2-40B4-BE49-F238E27FC236}">
-                <a16:creationId xmlns:a16="http://schemas.microsoft.com/office/drawing/2014/main" id="{8D5CF8E4-F394-47F4-A071-A4B8C003B2AB}"/>
+                <a16:creationId xmlns:a16="http://schemas.microsoft.com/office/drawing/2014/main" id="{8093DC8F-5A69-4E46-9FB9-571634287E8B}"/>
               </a:ext>
             </a:extLst>
           </p:cNvPr>
@@ -3556,70 +3644,144 @@
       </p:sp>
       <p:sp>
         <p:nvSpPr>
-          <p:cNvPr id="6" name="Datumsplatzhalter 5">
+          <p:cNvPr id="9" name="Gleichschenkliges Dreieck 8">
             <a:extLst>
               <a:ext uri="{FF2B5EF4-FFF2-40B4-BE49-F238E27FC236}">
-                <a16:creationId xmlns:a16="http://schemas.microsoft.com/office/drawing/2014/main" id="{8B6244C7-F88C-495E-A568-A0FD43437FA3}"/>
+                <a16:creationId xmlns:a16="http://schemas.microsoft.com/office/drawing/2014/main" id="{70C16FE9-85F3-4CEF-B909-33D38F9A7B90}"/>
               </a:ext>
             </a:extLst>
           </p:cNvPr>
-          <p:cNvSpPr>
-            <a:spLocks noGrp="1"/>
-          </p:cNvSpPr>
-          <p:nvPr>
-            <p:ph type="dt" sz="half" idx="10"/>
-          </p:nvPr>
-        </p:nvSpPr>
-        <p:spPr/>
-        <p:txBody>
-          <a:bodyPr/>
-          <a:lstStyle/>
-          <a:p>
-            <a:r>
-              <a:rPr lang="de-DE" dirty="0"/>
-              <a:t>28.11.2018</a:t>
-            </a:r>
-          </a:p>
-        </p:txBody>
-      </p:sp>
-      <p:sp>
-        <p:nvSpPr>
-          <p:cNvPr id="7" name="Fußzeilenplatzhalter 6">
-            <a:extLst>
-              <a:ext uri="{FF2B5EF4-FFF2-40B4-BE49-F238E27FC236}">
-                <a16:creationId xmlns:a16="http://schemas.microsoft.com/office/drawing/2014/main" id="{215373DB-ECF5-4BA5-9F01-18006B5A5D73}"/>
-              </a:ext>
-            </a:extLst>
-          </p:cNvPr>
-          <p:cNvSpPr>
-            <a:spLocks noGrp="1"/>
-          </p:cNvSpPr>
-          <p:nvPr>
-            <p:ph type="ftr" sz="quarter" idx="11"/>
-          </p:nvPr>
-        </p:nvSpPr>
-        <p:spPr/>
-        <p:txBody>
-          <a:bodyPr/>
-          <a:lstStyle/>
-          <a:p>
-            <a:r>
-              <a:rPr lang="en-US" dirty="0"/>
-              <a:t>Classification in Big Data Environments</a:t>
-            </a:r>
+          <p:cNvSpPr/>
+          <p:nvPr/>
+        </p:nvSpPr>
+        <p:spPr>
+          <a:xfrm rot="5400000">
+            <a:off x="2609343" y="3467938"/>
+            <a:ext cx="360040" cy="282163"/>
+          </a:xfrm>
+          <a:prstGeom prst="triangle">
+            <a:avLst/>
+          </a:prstGeom>
+          <a:solidFill>
+            <a:srgbClr val="C00000"/>
+          </a:solidFill>
+          <a:ln>
+            <a:noFill/>
+          </a:ln>
+        </p:spPr>
+        <p:style>
+          <a:lnRef idx="2">
+            <a:schemeClr val="accent1">
+              <a:shade val="50000"/>
+            </a:schemeClr>
+          </a:lnRef>
+          <a:fillRef idx="1">
+            <a:schemeClr val="accent1"/>
+          </a:fillRef>
+          <a:effectRef idx="0">
+            <a:schemeClr val="accent1"/>
+          </a:effectRef>
+          <a:fontRef idx="minor">
+            <a:schemeClr val="lt1"/>
+          </a:fontRef>
+        </p:style>
+        <p:txBody>
+          <a:bodyPr rtlCol="0" anchor="ctr"/>
+          <a:lstStyle/>
+          <a:p>
+            <a:pPr algn="ctr"/>
+            <a:endParaRPr lang="de-DE"/>
           </a:p>
         </p:txBody>
       </p:sp>
     </p:spTree>
     <p:extLst>
       <p:ext uri="{BB962C8B-B14F-4D97-AF65-F5344CB8AC3E}">
-        <p14:creationId xmlns:p14="http://schemas.microsoft.com/office/powerpoint/2010/main" val="135436929"/>
+        <p14:creationId xmlns:p14="http://schemas.microsoft.com/office/powerpoint/2010/main" val="3353068734"/>
       </p:ext>
     </p:extLst>
   </p:cSld>
   <p:clrMapOvr>
     <a:masterClrMapping/>
   </p:clrMapOvr>
+  <p:timing>
+    <p:tnLst>
+      <p:par>
+        <p:cTn id="1" dur="indefinite" restart="never" nodeType="tmRoot">
+          <p:childTnLst>
+            <p:seq concurrent="1" nextAc="seek">
+              <p:cTn id="2" dur="indefinite" nodeType="mainSeq">
+                <p:childTnLst>
+                  <p:par>
+                    <p:cTn id="3" fill="hold">
+                      <p:stCondLst>
+                        <p:cond delay="indefinite"/>
+                      </p:stCondLst>
+                      <p:childTnLst>
+                        <p:par>
+                          <p:cTn id="4" fill="hold">
+                            <p:stCondLst>
+                              <p:cond delay="0"/>
+                            </p:stCondLst>
+                            <p:childTnLst>
+                              <p:par>
+                                <p:cTn id="5" presetID="1" presetClass="entr" presetSubtype="0" fill="hold" grpId="0" nodeType="clickEffect">
+                                  <p:stCondLst>
+                                    <p:cond delay="0"/>
+                                  </p:stCondLst>
+                                  <p:childTnLst>
+                                    <p:set>
+                                      <p:cBhvr>
+                                        <p:cTn id="6" dur="1" fill="hold">
+                                          <p:stCondLst>
+                                            <p:cond delay="0"/>
+                                          </p:stCondLst>
+                                        </p:cTn>
+                                        <p:tgtEl>
+                                          <p:spTgt spid="9"/>
+                                        </p:tgtEl>
+                                        <p:attrNameLst>
+                                          <p:attrName>style.visibility</p:attrName>
+                                        </p:attrNameLst>
+                                      </p:cBhvr>
+                                      <p:to>
+                                        <p:strVal val="visible"/>
+                                      </p:to>
+                                    </p:set>
+                                  </p:childTnLst>
+                                </p:cTn>
+                              </p:par>
+                            </p:childTnLst>
+                          </p:cTn>
+                        </p:par>
+                      </p:childTnLst>
+                    </p:cTn>
+                  </p:par>
+                </p:childTnLst>
+              </p:cTn>
+              <p:prevCondLst>
+                <p:cond evt="onPrev" delay="0">
+                  <p:tgtEl>
+                    <p:sldTgt/>
+                  </p:tgtEl>
+                </p:cond>
+              </p:prevCondLst>
+              <p:nextCondLst>
+                <p:cond evt="onNext" delay="0">
+                  <p:tgtEl>
+                    <p:sldTgt/>
+                  </p:tgtEl>
+                </p:cond>
+              </p:nextCondLst>
+            </p:seq>
+          </p:childTnLst>
+        </p:cTn>
+      </p:par>
+    </p:tnLst>
+    <p:bldLst>
+      <p:bldP spid="9" grpId="0" animBg="1"/>
+    </p:bldLst>
+  </p:timing>
 </p:sld>
 </file>
 
@@ -3645,7 +3807,7 @@
           <p:cNvPr id="2" name="Titel 1">
             <a:extLst>
               <a:ext uri="{FF2B5EF4-FFF2-40B4-BE49-F238E27FC236}">
-                <a16:creationId xmlns:a16="http://schemas.microsoft.com/office/drawing/2014/main" id="{ED5F712F-99D6-4719-A4F7-53E71104747E}"/>
+                <a16:creationId xmlns:a16="http://schemas.microsoft.com/office/drawing/2014/main" id="{C902A17B-D96B-4443-AD76-D7AE4FAC4350}"/>
               </a:ext>
             </a:extLst>
           </p:cNvPr>
@@ -3662,8 +3824,8 @@
           <a:lstStyle/>
           <a:p>
             <a:r>
-              <a:rPr lang="de-DE" dirty="0"/>
-              <a:t>FABOLAS</a:t>
+              <a:rPr lang="en-US" dirty="0"/>
+              <a:t>Hyperparameter Optimization</a:t>
             </a:r>
           </a:p>
         </p:txBody>
@@ -3673,7 +3835,7 @@
           <p:cNvPr id="3" name="Datumsplatzhalter 2">
             <a:extLst>
               <a:ext uri="{FF2B5EF4-FFF2-40B4-BE49-F238E27FC236}">
-                <a16:creationId xmlns:a16="http://schemas.microsoft.com/office/drawing/2014/main" id="{314A6C1D-C455-4565-AD15-C483C04C94B7}"/>
+                <a16:creationId xmlns:a16="http://schemas.microsoft.com/office/drawing/2014/main" id="{D1423DE6-9403-43A4-B33F-C7E247881FBA}"/>
               </a:ext>
             </a:extLst>
           </p:cNvPr>
@@ -3702,7 +3864,7 @@
           <p:cNvPr id="4" name="Fußzeilenplatzhalter 3">
             <a:extLst>
               <a:ext uri="{FF2B5EF4-FFF2-40B4-BE49-F238E27FC236}">
-                <a16:creationId xmlns:a16="http://schemas.microsoft.com/office/drawing/2014/main" id="{D1566B7C-BA1A-4778-8CBF-15AFB2C203F6}"/>
+                <a16:creationId xmlns:a16="http://schemas.microsoft.com/office/drawing/2014/main" id="{822FFDE0-B215-4059-A8CF-4B2B0FA8FF9D}"/>
               </a:ext>
             </a:extLst>
           </p:cNvPr>
@@ -3731,7 +3893,7 @@
           <p:cNvPr id="5" name="Foliennummernplatzhalter 4">
             <a:extLst>
               <a:ext uri="{FF2B5EF4-FFF2-40B4-BE49-F238E27FC236}">
-                <a16:creationId xmlns:a16="http://schemas.microsoft.com/office/drawing/2014/main" id="{CCAB178F-8D01-4C85-9964-DFC128D83FA1}"/>
+                <a16:creationId xmlns:a16="http://schemas.microsoft.com/office/drawing/2014/main" id="{33FFFF87-A9E5-43F3-ADF5-BB2298A0AE4E}"/>
               </a:ext>
             </a:extLst>
           </p:cNvPr>
@@ -3756,16 +3918,455 @@
           </a:p>
         </p:txBody>
       </p:sp>
+      <p:sp>
+        <p:nvSpPr>
+          <p:cNvPr id="12" name="Textfeld 11">
+            <a:extLst>
+              <a:ext uri="{FF2B5EF4-FFF2-40B4-BE49-F238E27FC236}">
+                <a16:creationId xmlns:a16="http://schemas.microsoft.com/office/drawing/2014/main" id="{2404A735-81D7-40D4-9D80-2938B6DCA5C6}"/>
+              </a:ext>
+            </a:extLst>
+          </p:cNvPr>
+          <p:cNvSpPr txBox="1"/>
+          <p:nvPr/>
+        </p:nvSpPr>
+        <p:spPr>
+          <a:xfrm>
+            <a:off x="5968476" y="1988841"/>
+            <a:ext cx="2271776" cy="584775"/>
+          </a:xfrm>
+          <a:prstGeom prst="rect">
+            <a:avLst/>
+          </a:prstGeom>
+          <a:noFill/>
+        </p:spPr>
+        <p:txBody>
+          <a:bodyPr wrap="none" rtlCol="0">
+            <a:spAutoFit/>
+          </a:bodyPr>
+          <a:lstStyle/>
+          <a:p>
+            <a:pPr algn="ctr"/>
+            <a:r>
+              <a:rPr lang="de-DE" sz="3200" dirty="0">
+                <a:latin typeface="Roboto Light" panose="020B0604020202020204" charset="0"/>
+                <a:ea typeface="Roboto Light" panose="020B0604020202020204" charset="0"/>
+              </a:rPr>
+              <a:t>Grid Search</a:t>
+            </a:r>
+          </a:p>
+        </p:txBody>
+      </p:sp>
+      <p:sp>
+        <p:nvSpPr>
+          <p:cNvPr id="13" name="Textfeld 12">
+            <a:extLst>
+              <a:ext uri="{FF2B5EF4-FFF2-40B4-BE49-F238E27FC236}">
+                <a16:creationId xmlns:a16="http://schemas.microsoft.com/office/drawing/2014/main" id="{C1014064-496B-4DF1-81B3-5A2AC13E6869}"/>
+              </a:ext>
+            </a:extLst>
+          </p:cNvPr>
+          <p:cNvSpPr txBox="1"/>
+          <p:nvPr/>
+        </p:nvSpPr>
+        <p:spPr>
+          <a:xfrm>
+            <a:off x="8655087" y="1988840"/>
+            <a:ext cx="3062057" cy="584775"/>
+          </a:xfrm>
+          <a:prstGeom prst="rect">
+            <a:avLst/>
+          </a:prstGeom>
+          <a:noFill/>
+        </p:spPr>
+        <p:txBody>
+          <a:bodyPr wrap="none" rtlCol="0">
+            <a:spAutoFit/>
+          </a:bodyPr>
+          <a:lstStyle/>
+          <a:p>
+            <a:pPr algn="ctr"/>
+            <a:r>
+              <a:rPr lang="de-DE" sz="3200" dirty="0">
+                <a:latin typeface="Roboto Light" panose="020B0604020202020204" charset="0"/>
+                <a:ea typeface="Roboto Light" panose="020B0604020202020204" charset="0"/>
+              </a:rPr>
+              <a:t>Random Search</a:t>
+            </a:r>
+          </a:p>
+        </p:txBody>
+      </p:sp>
+      <p:pic>
+        <p:nvPicPr>
+          <p:cNvPr id="15" name="Grafik 14">
+            <a:extLst>
+              <a:ext uri="{FF2B5EF4-FFF2-40B4-BE49-F238E27FC236}">
+                <a16:creationId xmlns:a16="http://schemas.microsoft.com/office/drawing/2014/main" id="{EFE8CC7F-1DBE-4B4B-8574-C95187B5B7A1}"/>
+              </a:ext>
+            </a:extLst>
+          </p:cNvPr>
+          <p:cNvPicPr>
+            <a:picLocks noChangeAspect="1"/>
+          </p:cNvPicPr>
+          <p:nvPr/>
+        </p:nvPicPr>
+        <p:blipFill>
+          <a:blip r:embed="rId2">
+            <a:extLst>
+              <a:ext uri="{28A0092B-C50C-407E-A947-70E740481C1C}">
+                <a14:useLocalDpi xmlns:a14="http://schemas.microsoft.com/office/drawing/2010/main" val="0"/>
+              </a:ext>
+              <a:ext uri="{96DAC541-7B7A-43D3-8B79-37D633B846F1}">
+                <asvg:svgBlip xmlns:asvg="http://schemas.microsoft.com/office/drawing/2016/SVG/main" r:embed="rId3"/>
+              </a:ext>
+            </a:extLst>
+          </a:blip>
+          <a:stretch>
+            <a:fillRect/>
+          </a:stretch>
+        </p:blipFill>
+        <p:spPr>
+          <a:xfrm>
+            <a:off x="767408" y="1206248"/>
+            <a:ext cx="4762500" cy="4762500"/>
+          </a:xfrm>
+          <a:prstGeom prst="rect">
+            <a:avLst/>
+          </a:prstGeom>
+        </p:spPr>
+      </p:pic>
+      <p:pic>
+        <p:nvPicPr>
+          <p:cNvPr id="17" name="Grafik 16">
+            <a:extLst>
+              <a:ext uri="{FF2B5EF4-FFF2-40B4-BE49-F238E27FC236}">
+                <a16:creationId xmlns:a16="http://schemas.microsoft.com/office/drawing/2014/main" id="{76CF379B-5081-45A4-A074-5C86CD29C22B}"/>
+              </a:ext>
+            </a:extLst>
+          </p:cNvPr>
+          <p:cNvPicPr>
+            <a:picLocks noChangeAspect="1"/>
+          </p:cNvPicPr>
+          <p:nvPr/>
+        </p:nvPicPr>
+        <p:blipFill>
+          <a:blip r:embed="rId4">
+            <a:extLst>
+              <a:ext uri="{28A0092B-C50C-407E-A947-70E740481C1C}">
+                <a14:useLocalDpi xmlns:a14="http://schemas.microsoft.com/office/drawing/2010/main" val="0"/>
+              </a:ext>
+              <a:ext uri="{96DAC541-7B7A-43D3-8B79-37D633B846F1}">
+                <asvg:svgBlip xmlns:asvg="http://schemas.microsoft.com/office/drawing/2016/SVG/main" r:embed="rId5"/>
+              </a:ext>
+            </a:extLst>
+          </a:blip>
+          <a:stretch>
+            <a:fillRect/>
+          </a:stretch>
+        </p:blipFill>
+        <p:spPr>
+          <a:xfrm>
+            <a:off x="767408" y="1205231"/>
+            <a:ext cx="4762500" cy="4762500"/>
+          </a:xfrm>
+          <a:prstGeom prst="rect">
+            <a:avLst/>
+          </a:prstGeom>
+        </p:spPr>
+      </p:pic>
+      <p:pic>
+        <p:nvPicPr>
+          <p:cNvPr id="19" name="Grafik 18">
+            <a:extLst>
+              <a:ext uri="{FF2B5EF4-FFF2-40B4-BE49-F238E27FC236}">
+                <a16:creationId xmlns:a16="http://schemas.microsoft.com/office/drawing/2014/main" id="{E54F7E07-5B62-48CC-9B25-E94F131101E0}"/>
+              </a:ext>
+            </a:extLst>
+          </p:cNvPr>
+          <p:cNvPicPr>
+            <a:picLocks noChangeAspect="1"/>
+          </p:cNvPicPr>
+          <p:nvPr/>
+        </p:nvPicPr>
+        <p:blipFill>
+          <a:blip r:embed="rId6">
+            <a:extLst>
+              <a:ext uri="{28A0092B-C50C-407E-A947-70E740481C1C}">
+                <a14:useLocalDpi xmlns:a14="http://schemas.microsoft.com/office/drawing/2010/main" val="0"/>
+              </a:ext>
+              <a:ext uri="{96DAC541-7B7A-43D3-8B79-37D633B846F1}">
+                <asvg:svgBlip xmlns:asvg="http://schemas.microsoft.com/office/drawing/2016/SVG/main" r:embed="rId7"/>
+              </a:ext>
+            </a:extLst>
+          </a:blip>
+          <a:stretch>
+            <a:fillRect/>
+          </a:stretch>
+        </p:blipFill>
+        <p:spPr>
+          <a:xfrm>
+            <a:off x="767408" y="1205231"/>
+            <a:ext cx="4762500" cy="4762500"/>
+          </a:xfrm>
+          <a:prstGeom prst="rect">
+            <a:avLst/>
+          </a:prstGeom>
+        </p:spPr>
+      </p:pic>
+      <p:sp>
+        <p:nvSpPr>
+          <p:cNvPr id="20" name="Textfeld 19">
+            <a:extLst>
+              <a:ext uri="{FF2B5EF4-FFF2-40B4-BE49-F238E27FC236}">
+                <a16:creationId xmlns:a16="http://schemas.microsoft.com/office/drawing/2014/main" id="{FE2993E5-5BDD-479E-820C-CDA46F260531}"/>
+              </a:ext>
+            </a:extLst>
+          </p:cNvPr>
+          <p:cNvSpPr txBox="1"/>
+          <p:nvPr/>
+        </p:nvSpPr>
+        <p:spPr>
+          <a:xfrm>
+            <a:off x="6038765" y="1249596"/>
+            <a:ext cx="5678379" cy="523220"/>
+          </a:xfrm>
+          <a:prstGeom prst="rect">
+            <a:avLst/>
+          </a:prstGeom>
+          <a:noFill/>
+        </p:spPr>
+        <p:txBody>
+          <a:bodyPr wrap="square" rtlCol="0">
+            <a:spAutoFit/>
+          </a:bodyPr>
+          <a:lstStyle/>
+          <a:p>
+            <a:pPr algn="ctr"/>
+            <a:r>
+              <a:rPr lang="en-US" sz="2800" b="1" dirty="0">
+                <a:latin typeface="Roboto Light" panose="020B0604020202020204" charset="0"/>
+                <a:ea typeface="Roboto Light" panose="020B0604020202020204" charset="0"/>
+              </a:rPr>
+              <a:t>Naive Approaches:</a:t>
+            </a:r>
+          </a:p>
+        </p:txBody>
+      </p:sp>
     </p:spTree>
     <p:extLst>
       <p:ext uri="{BB962C8B-B14F-4D97-AF65-F5344CB8AC3E}">
-        <p14:creationId xmlns:p14="http://schemas.microsoft.com/office/powerpoint/2010/main" val="2968017310"/>
+        <p14:creationId xmlns:p14="http://schemas.microsoft.com/office/powerpoint/2010/main" val="3326630193"/>
       </p:ext>
     </p:extLst>
   </p:cSld>
   <p:clrMapOvr>
     <a:masterClrMapping/>
   </p:clrMapOvr>
+  <p:timing>
+    <p:tnLst>
+      <p:par>
+        <p:cTn id="1" dur="indefinite" restart="never" nodeType="tmRoot">
+          <p:childTnLst>
+            <p:seq concurrent="1" nextAc="seek">
+              <p:cTn id="2" dur="indefinite" nodeType="mainSeq">
+                <p:childTnLst>
+                  <p:par>
+                    <p:cTn id="3" fill="hold">
+                      <p:stCondLst>
+                        <p:cond delay="indefinite"/>
+                      </p:stCondLst>
+                      <p:childTnLst>
+                        <p:par>
+                          <p:cTn id="4" fill="hold">
+                            <p:stCondLst>
+                              <p:cond delay="0"/>
+                            </p:stCondLst>
+                            <p:childTnLst>
+                              <p:par>
+                                <p:cTn id="5" presetID="1" presetClass="entr" presetSubtype="0" fill="hold" nodeType="clickEffect">
+                                  <p:stCondLst>
+                                    <p:cond delay="0"/>
+                                  </p:stCondLst>
+                                  <p:childTnLst>
+                                    <p:set>
+                                      <p:cBhvr>
+                                        <p:cTn id="6" dur="1" fill="hold">
+                                          <p:stCondLst>
+                                            <p:cond delay="0"/>
+                                          </p:stCondLst>
+                                        </p:cTn>
+                                        <p:tgtEl>
+                                          <p:spTgt spid="17"/>
+                                        </p:tgtEl>
+                                        <p:attrNameLst>
+                                          <p:attrName>style.visibility</p:attrName>
+                                        </p:attrNameLst>
+                                      </p:cBhvr>
+                                      <p:to>
+                                        <p:strVal val="visible"/>
+                                      </p:to>
+                                    </p:set>
+                                  </p:childTnLst>
+                                </p:cTn>
+                              </p:par>
+                              <p:par>
+                                <p:cTn id="7" presetID="1" presetClass="entr" presetSubtype="0" fill="hold" grpId="0" nodeType="withEffect">
+                                  <p:stCondLst>
+                                    <p:cond delay="0"/>
+                                  </p:stCondLst>
+                                  <p:childTnLst>
+                                    <p:set>
+                                      <p:cBhvr>
+                                        <p:cTn id="8" dur="1" fill="hold">
+                                          <p:stCondLst>
+                                            <p:cond delay="0"/>
+                                          </p:stCondLst>
+                                        </p:cTn>
+                                        <p:tgtEl>
+                                          <p:spTgt spid="12"/>
+                                        </p:tgtEl>
+                                        <p:attrNameLst>
+                                          <p:attrName>style.visibility</p:attrName>
+                                        </p:attrNameLst>
+                                      </p:cBhvr>
+                                      <p:to>
+                                        <p:strVal val="visible"/>
+                                      </p:to>
+                                    </p:set>
+                                  </p:childTnLst>
+                                </p:cTn>
+                              </p:par>
+                            </p:childTnLst>
+                          </p:cTn>
+                        </p:par>
+                      </p:childTnLst>
+                    </p:cTn>
+                  </p:par>
+                  <p:par>
+                    <p:cTn id="9" fill="hold">
+                      <p:stCondLst>
+                        <p:cond delay="indefinite"/>
+                      </p:stCondLst>
+                      <p:childTnLst>
+                        <p:par>
+                          <p:cTn id="10" fill="hold">
+                            <p:stCondLst>
+                              <p:cond delay="0"/>
+                            </p:stCondLst>
+                            <p:childTnLst>
+                              <p:par>
+                                <p:cTn id="11" presetID="1" presetClass="entr" presetSubtype="0" fill="hold" nodeType="clickEffect">
+                                  <p:stCondLst>
+                                    <p:cond delay="0"/>
+                                  </p:stCondLst>
+                                  <p:childTnLst>
+                                    <p:set>
+                                      <p:cBhvr>
+                                        <p:cTn id="12" dur="1" fill="hold">
+                                          <p:stCondLst>
+                                            <p:cond delay="0"/>
+                                          </p:stCondLst>
+                                        </p:cTn>
+                                        <p:tgtEl>
+                                          <p:spTgt spid="19"/>
+                                        </p:tgtEl>
+                                        <p:attrNameLst>
+                                          <p:attrName>style.visibility</p:attrName>
+                                        </p:attrNameLst>
+                                      </p:cBhvr>
+                                      <p:to>
+                                        <p:strVal val="visible"/>
+                                      </p:to>
+                                    </p:set>
+                                  </p:childTnLst>
+                                </p:cTn>
+                              </p:par>
+                              <p:par>
+                                <p:cTn id="13" presetID="1" presetClass="entr" presetSubtype="0" fill="hold" grpId="0" nodeType="withEffect">
+                                  <p:stCondLst>
+                                    <p:cond delay="0"/>
+                                  </p:stCondLst>
+                                  <p:childTnLst>
+                                    <p:set>
+                                      <p:cBhvr>
+                                        <p:cTn id="14" dur="1" fill="hold">
+                                          <p:stCondLst>
+                                            <p:cond delay="0"/>
+                                          </p:stCondLst>
+                                        </p:cTn>
+                                        <p:tgtEl>
+                                          <p:spTgt spid="13"/>
+                                        </p:tgtEl>
+                                        <p:attrNameLst>
+                                          <p:attrName>style.visibility</p:attrName>
+                                        </p:attrNameLst>
+                                      </p:cBhvr>
+                                      <p:to>
+                                        <p:strVal val="visible"/>
+                                      </p:to>
+                                    </p:set>
+                                  </p:childTnLst>
+                                </p:cTn>
+                              </p:par>
+                              <p:par>
+                                <p:cTn id="15" presetID="1" presetClass="exit" presetSubtype="0" fill="hold" nodeType="withEffect">
+                                  <p:stCondLst>
+                                    <p:cond delay="0"/>
+                                  </p:stCondLst>
+                                  <p:childTnLst>
+                                    <p:set>
+                                      <p:cBhvr>
+                                        <p:cTn id="16" dur="1" fill="hold">
+                                          <p:stCondLst>
+                                            <p:cond delay="0"/>
+                                          </p:stCondLst>
+                                        </p:cTn>
+                                        <p:tgtEl>
+                                          <p:spTgt spid="17"/>
+                                        </p:tgtEl>
+                                        <p:attrNameLst>
+                                          <p:attrName>style.visibility</p:attrName>
+                                        </p:attrNameLst>
+                                      </p:cBhvr>
+                                      <p:to>
+                                        <p:strVal val="hidden"/>
+                                      </p:to>
+                                    </p:set>
+                                  </p:childTnLst>
+                                </p:cTn>
+                              </p:par>
+                            </p:childTnLst>
+                          </p:cTn>
+                        </p:par>
+                      </p:childTnLst>
+                    </p:cTn>
+                  </p:par>
+                </p:childTnLst>
+              </p:cTn>
+              <p:prevCondLst>
+                <p:cond evt="onPrev" delay="0">
+                  <p:tgtEl>
+                    <p:sldTgt/>
+                  </p:tgtEl>
+                </p:cond>
+              </p:prevCondLst>
+              <p:nextCondLst>
+                <p:cond evt="onNext" delay="0">
+                  <p:tgtEl>
+                    <p:sldTgt/>
+                  </p:tgtEl>
+                </p:cond>
+              </p:nextCondLst>
+            </p:seq>
+          </p:childTnLst>
+        </p:cTn>
+      </p:par>
+    </p:tnLst>
+    <p:bldLst>
+      <p:bldP spid="12" grpId="0"/>
+      <p:bldP spid="13" grpId="0"/>
+    </p:bldLst>
+  </p:timing>
 </p:sld>
 </file>
 
@@ -3788,6 +4389,1946 @@
       </p:grpSpPr>
       <p:sp>
         <p:nvSpPr>
+          <p:cNvPr id="2" name="Titel 1">
+            <a:extLst>
+              <a:ext uri="{FF2B5EF4-FFF2-40B4-BE49-F238E27FC236}">
+                <a16:creationId xmlns:a16="http://schemas.microsoft.com/office/drawing/2014/main" id="{C902A17B-D96B-4443-AD76-D7AE4FAC4350}"/>
+              </a:ext>
+            </a:extLst>
+          </p:cNvPr>
+          <p:cNvSpPr>
+            <a:spLocks noGrp="1"/>
+          </p:cNvSpPr>
+          <p:nvPr>
+            <p:ph type="title"/>
+          </p:nvPr>
+        </p:nvSpPr>
+        <p:spPr/>
+        <p:txBody>
+          <a:bodyPr/>
+          <a:lstStyle/>
+          <a:p>
+            <a:r>
+              <a:rPr lang="en-US" dirty="0"/>
+              <a:t>Hyperparameter</a:t>
+            </a:r>
+            <a:r>
+              <a:rPr lang="de-DE" dirty="0"/>
+              <a:t> </a:t>
+            </a:r>
+            <a:r>
+              <a:rPr lang="en-US" dirty="0"/>
+              <a:t>Optimization</a:t>
+            </a:r>
+          </a:p>
+        </p:txBody>
+      </p:sp>
+      <p:sp>
+        <p:nvSpPr>
+          <p:cNvPr id="3" name="Datumsplatzhalter 2">
+            <a:extLst>
+              <a:ext uri="{FF2B5EF4-FFF2-40B4-BE49-F238E27FC236}">
+                <a16:creationId xmlns:a16="http://schemas.microsoft.com/office/drawing/2014/main" id="{D1423DE6-9403-43A4-B33F-C7E247881FBA}"/>
+              </a:ext>
+            </a:extLst>
+          </p:cNvPr>
+          <p:cNvSpPr>
+            <a:spLocks noGrp="1"/>
+          </p:cNvSpPr>
+          <p:nvPr>
+            <p:ph type="dt" sz="half" idx="10"/>
+          </p:nvPr>
+        </p:nvSpPr>
+        <p:spPr/>
+        <p:txBody>
+          <a:bodyPr/>
+          <a:lstStyle/>
+          <a:p>
+            <a:r>
+              <a:rPr lang="de-DE" dirty="0"/>
+              <a:t>28.11.2018</a:t>
+            </a:r>
+          </a:p>
+        </p:txBody>
+      </p:sp>
+      <p:sp>
+        <p:nvSpPr>
+          <p:cNvPr id="4" name="Fußzeilenplatzhalter 3">
+            <a:extLst>
+              <a:ext uri="{FF2B5EF4-FFF2-40B4-BE49-F238E27FC236}">
+                <a16:creationId xmlns:a16="http://schemas.microsoft.com/office/drawing/2014/main" id="{822FFDE0-B215-4059-A8CF-4B2B0FA8FF9D}"/>
+              </a:ext>
+            </a:extLst>
+          </p:cNvPr>
+          <p:cNvSpPr>
+            <a:spLocks noGrp="1"/>
+          </p:cNvSpPr>
+          <p:nvPr>
+            <p:ph type="ftr" sz="quarter" idx="11"/>
+          </p:nvPr>
+        </p:nvSpPr>
+        <p:spPr/>
+        <p:txBody>
+          <a:bodyPr/>
+          <a:lstStyle/>
+          <a:p>
+            <a:r>
+              <a:rPr lang="en-US" dirty="0"/>
+              <a:t>Classification in Big Data Environments</a:t>
+            </a:r>
+          </a:p>
+        </p:txBody>
+      </p:sp>
+      <p:sp>
+        <p:nvSpPr>
+          <p:cNvPr id="5" name="Foliennummernplatzhalter 4">
+            <a:extLst>
+              <a:ext uri="{FF2B5EF4-FFF2-40B4-BE49-F238E27FC236}">
+                <a16:creationId xmlns:a16="http://schemas.microsoft.com/office/drawing/2014/main" id="{33FFFF87-A9E5-43F3-ADF5-BB2298A0AE4E}"/>
+              </a:ext>
+            </a:extLst>
+          </p:cNvPr>
+          <p:cNvSpPr>
+            <a:spLocks noGrp="1"/>
+          </p:cNvSpPr>
+          <p:nvPr>
+            <p:ph type="sldNum" sz="quarter" idx="12"/>
+          </p:nvPr>
+        </p:nvSpPr>
+        <p:spPr/>
+        <p:txBody>
+          <a:bodyPr/>
+          <a:lstStyle/>
+          <a:p>
+            <a:fld id="{F4DAF760-8A09-427D-9634-9AF01F07ABD5}" type="slidenum">
+              <a:rPr lang="de-DE" smtClean="0"/>
+              <a:pPr/>
+              <a:t>4</a:t>
+            </a:fld>
+            <a:endParaRPr lang="de-DE" dirty="0"/>
+          </a:p>
+        </p:txBody>
+      </p:sp>
+      <p:sp>
+        <p:nvSpPr>
+          <p:cNvPr id="11" name="Textfeld 10">
+            <a:extLst>
+              <a:ext uri="{FF2B5EF4-FFF2-40B4-BE49-F238E27FC236}">
+                <a16:creationId xmlns:a16="http://schemas.microsoft.com/office/drawing/2014/main" id="{6AC27C13-633E-42A3-A4C0-2BDF7EB089AE}"/>
+              </a:ext>
+            </a:extLst>
+          </p:cNvPr>
+          <p:cNvSpPr txBox="1"/>
+          <p:nvPr/>
+        </p:nvSpPr>
+        <p:spPr>
+          <a:xfrm>
+            <a:off x="6038765" y="1249596"/>
+            <a:ext cx="5678379" cy="523220"/>
+          </a:xfrm>
+          <a:prstGeom prst="rect">
+            <a:avLst/>
+          </a:prstGeom>
+          <a:noFill/>
+        </p:spPr>
+        <p:txBody>
+          <a:bodyPr wrap="square" rtlCol="0">
+            <a:spAutoFit/>
+          </a:bodyPr>
+          <a:lstStyle/>
+          <a:p>
+            <a:pPr algn="ctr"/>
+            <a:r>
+              <a:rPr lang="en-US" sz="2800" b="1" dirty="0">
+                <a:solidFill>
+                  <a:schemeClr val="tx1">
+                    <a:alpha val="50000"/>
+                  </a:schemeClr>
+                </a:solidFill>
+                <a:latin typeface="Roboto Light" panose="020B0604020202020204" charset="0"/>
+                <a:ea typeface="Roboto Light" panose="020B0604020202020204" charset="0"/>
+              </a:rPr>
+              <a:t>Naive Approaches:</a:t>
+            </a:r>
+          </a:p>
+        </p:txBody>
+      </p:sp>
+      <p:sp>
+        <p:nvSpPr>
+          <p:cNvPr id="12" name="Textfeld 11">
+            <a:extLst>
+              <a:ext uri="{FF2B5EF4-FFF2-40B4-BE49-F238E27FC236}">
+                <a16:creationId xmlns:a16="http://schemas.microsoft.com/office/drawing/2014/main" id="{2404A735-81D7-40D4-9D80-2938B6DCA5C6}"/>
+              </a:ext>
+            </a:extLst>
+          </p:cNvPr>
+          <p:cNvSpPr txBox="1"/>
+          <p:nvPr/>
+        </p:nvSpPr>
+        <p:spPr>
+          <a:xfrm>
+            <a:off x="5968476" y="1988841"/>
+            <a:ext cx="2271776" cy="584775"/>
+          </a:xfrm>
+          <a:prstGeom prst="rect">
+            <a:avLst/>
+          </a:prstGeom>
+          <a:noFill/>
+        </p:spPr>
+        <p:txBody>
+          <a:bodyPr wrap="none" rtlCol="0">
+            <a:spAutoFit/>
+          </a:bodyPr>
+          <a:lstStyle/>
+          <a:p>
+            <a:pPr algn="ctr"/>
+            <a:r>
+              <a:rPr lang="de-DE" sz="3200" dirty="0">
+                <a:solidFill>
+                  <a:schemeClr val="tx1">
+                    <a:alpha val="50000"/>
+                  </a:schemeClr>
+                </a:solidFill>
+                <a:latin typeface="Roboto Light" panose="020B0604020202020204" charset="0"/>
+                <a:ea typeface="Roboto Light" panose="020B0604020202020204" charset="0"/>
+              </a:rPr>
+              <a:t>Grid Search</a:t>
+            </a:r>
+          </a:p>
+        </p:txBody>
+      </p:sp>
+      <p:sp>
+        <p:nvSpPr>
+          <p:cNvPr id="13" name="Textfeld 12">
+            <a:extLst>
+              <a:ext uri="{FF2B5EF4-FFF2-40B4-BE49-F238E27FC236}">
+                <a16:creationId xmlns:a16="http://schemas.microsoft.com/office/drawing/2014/main" id="{C1014064-496B-4DF1-81B3-5A2AC13E6869}"/>
+              </a:ext>
+            </a:extLst>
+          </p:cNvPr>
+          <p:cNvSpPr txBox="1"/>
+          <p:nvPr/>
+        </p:nvSpPr>
+        <p:spPr>
+          <a:xfrm>
+            <a:off x="8655087" y="1988840"/>
+            <a:ext cx="3062057" cy="584775"/>
+          </a:xfrm>
+          <a:prstGeom prst="rect">
+            <a:avLst/>
+          </a:prstGeom>
+          <a:noFill/>
+        </p:spPr>
+        <p:txBody>
+          <a:bodyPr wrap="none" rtlCol="0">
+            <a:spAutoFit/>
+          </a:bodyPr>
+          <a:lstStyle/>
+          <a:p>
+            <a:pPr algn="ctr"/>
+            <a:r>
+              <a:rPr lang="de-DE" sz="3200" dirty="0">
+                <a:solidFill>
+                  <a:schemeClr val="tx1">
+                    <a:alpha val="50000"/>
+                  </a:schemeClr>
+                </a:solidFill>
+                <a:latin typeface="Roboto Light" panose="020B0604020202020204" charset="0"/>
+                <a:ea typeface="Roboto Light" panose="020B0604020202020204" charset="0"/>
+              </a:rPr>
+              <a:t>Random Search</a:t>
+            </a:r>
+          </a:p>
+        </p:txBody>
+      </p:sp>
+      <p:pic>
+        <p:nvPicPr>
+          <p:cNvPr id="15" name="Grafik 14">
+            <a:extLst>
+              <a:ext uri="{FF2B5EF4-FFF2-40B4-BE49-F238E27FC236}">
+                <a16:creationId xmlns:a16="http://schemas.microsoft.com/office/drawing/2014/main" id="{EFE8CC7F-1DBE-4B4B-8574-C95187B5B7A1}"/>
+              </a:ext>
+            </a:extLst>
+          </p:cNvPr>
+          <p:cNvPicPr>
+            <a:picLocks noChangeAspect="1"/>
+          </p:cNvPicPr>
+          <p:nvPr/>
+        </p:nvPicPr>
+        <p:blipFill>
+          <a:blip r:embed="rId2">
+            <a:extLst>
+              <a:ext uri="{28A0092B-C50C-407E-A947-70E740481C1C}">
+                <a14:useLocalDpi xmlns:a14="http://schemas.microsoft.com/office/drawing/2010/main" val="0"/>
+              </a:ext>
+              <a:ext uri="{96DAC541-7B7A-43D3-8B79-37D633B846F1}">
+                <asvg:svgBlip xmlns:asvg="http://schemas.microsoft.com/office/drawing/2016/SVG/main" r:embed="rId3"/>
+              </a:ext>
+            </a:extLst>
+          </a:blip>
+          <a:stretch>
+            <a:fillRect/>
+          </a:stretch>
+        </p:blipFill>
+        <p:spPr>
+          <a:xfrm>
+            <a:off x="767408" y="1206248"/>
+            <a:ext cx="4762500" cy="4762500"/>
+          </a:xfrm>
+          <a:prstGeom prst="rect">
+            <a:avLst/>
+          </a:prstGeom>
+        </p:spPr>
+      </p:pic>
+      <p:sp>
+        <p:nvSpPr>
+          <p:cNvPr id="14" name="Textfeld 13">
+            <a:extLst>
+              <a:ext uri="{FF2B5EF4-FFF2-40B4-BE49-F238E27FC236}">
+                <a16:creationId xmlns:a16="http://schemas.microsoft.com/office/drawing/2014/main" id="{5304EBB5-33C3-4D2C-AEA3-B00F3ADC23B3}"/>
+              </a:ext>
+            </a:extLst>
+          </p:cNvPr>
+          <p:cNvSpPr txBox="1"/>
+          <p:nvPr/>
+        </p:nvSpPr>
+        <p:spPr>
+          <a:xfrm>
+            <a:off x="6038765" y="3167390"/>
+            <a:ext cx="5440004" cy="523220"/>
+          </a:xfrm>
+          <a:prstGeom prst="rect">
+            <a:avLst/>
+          </a:prstGeom>
+          <a:noFill/>
+        </p:spPr>
+        <p:txBody>
+          <a:bodyPr wrap="square" rtlCol="0">
+            <a:spAutoFit/>
+          </a:bodyPr>
+          <a:lstStyle/>
+          <a:p>
+            <a:pPr algn="ctr"/>
+            <a:r>
+              <a:rPr lang="en-US" sz="2800" b="1" dirty="0">
+                <a:latin typeface="Roboto Light" panose="020B0604020202020204" charset="0"/>
+                <a:ea typeface="Roboto Light" panose="020B0604020202020204" charset="0"/>
+              </a:rPr>
+              <a:t>Optimization Ideas:</a:t>
+            </a:r>
+          </a:p>
+        </p:txBody>
+      </p:sp>
+      <p:pic>
+        <p:nvPicPr>
+          <p:cNvPr id="9" name="Grafik 8">
+            <a:extLst>
+              <a:ext uri="{FF2B5EF4-FFF2-40B4-BE49-F238E27FC236}">
+                <a16:creationId xmlns:a16="http://schemas.microsoft.com/office/drawing/2014/main" id="{350FF788-5D34-46F3-8198-59FE95FF9A1B}"/>
+              </a:ext>
+            </a:extLst>
+          </p:cNvPr>
+          <p:cNvPicPr>
+            <a:picLocks noChangeAspect="1"/>
+          </p:cNvPicPr>
+          <p:nvPr/>
+        </p:nvPicPr>
+        <p:blipFill>
+          <a:blip r:embed="rId4">
+            <a:extLst>
+              <a:ext uri="{28A0092B-C50C-407E-A947-70E740481C1C}">
+                <a14:useLocalDpi xmlns:a14="http://schemas.microsoft.com/office/drawing/2010/main" val="0"/>
+              </a:ext>
+              <a:ext uri="{96DAC541-7B7A-43D3-8B79-37D633B846F1}">
+                <asvg:svgBlip xmlns:asvg="http://schemas.microsoft.com/office/drawing/2016/SVG/main" r:embed="rId5"/>
+              </a:ext>
+            </a:extLst>
+          </a:blip>
+          <a:stretch>
+            <a:fillRect/>
+          </a:stretch>
+        </p:blipFill>
+        <p:spPr>
+          <a:xfrm>
+            <a:off x="767408" y="1206248"/>
+            <a:ext cx="4762500" cy="4762500"/>
+          </a:xfrm>
+          <a:prstGeom prst="rect">
+            <a:avLst/>
+          </a:prstGeom>
+        </p:spPr>
+      </p:pic>
+      <p:sp>
+        <p:nvSpPr>
+          <p:cNvPr id="24" name="Textfeld 23">
+            <a:extLst>
+              <a:ext uri="{FF2B5EF4-FFF2-40B4-BE49-F238E27FC236}">
+                <a16:creationId xmlns:a16="http://schemas.microsoft.com/office/drawing/2014/main" id="{68C3923E-0555-4233-AB2C-6BF2AD9FB2CA}"/>
+              </a:ext>
+            </a:extLst>
+          </p:cNvPr>
+          <p:cNvSpPr txBox="1"/>
+          <p:nvPr/>
+        </p:nvSpPr>
+        <p:spPr>
+          <a:xfrm>
+            <a:off x="5929890" y="3670766"/>
+            <a:ext cx="5998758" cy="1918474"/>
+          </a:xfrm>
+          <a:prstGeom prst="rect">
+            <a:avLst/>
+          </a:prstGeom>
+          <a:noFill/>
+        </p:spPr>
+        <p:txBody>
+          <a:bodyPr wrap="none" rtlCol="0">
+            <a:spAutoFit/>
+          </a:bodyPr>
+          <a:lstStyle/>
+          <a:p>
+            <a:pPr>
+              <a:lnSpc>
+                <a:spcPct val="200000"/>
+              </a:lnSpc>
+            </a:pPr>
+            <a:r>
+              <a:rPr lang="en-US" sz="3200" dirty="0">
+                <a:latin typeface="Roboto Light" panose="020B0604020202020204" charset="0"/>
+                <a:ea typeface="Roboto Light" panose="020B0604020202020204" charset="0"/>
+              </a:rPr>
+              <a:t>Estimate good probing positions</a:t>
+            </a:r>
+          </a:p>
+          <a:p>
+            <a:pPr>
+              <a:lnSpc>
+                <a:spcPct val="200000"/>
+              </a:lnSpc>
+            </a:pPr>
+            <a:r>
+              <a:rPr lang="en-US" sz="3200" dirty="0">
+                <a:latin typeface="Roboto Light" panose="020B0604020202020204" charset="0"/>
+                <a:ea typeface="Roboto Light" panose="020B0604020202020204" charset="0"/>
+              </a:rPr>
+              <a:t>Terminate bad probes early</a:t>
+            </a:r>
+          </a:p>
+        </p:txBody>
+      </p:sp>
+      <p:cxnSp>
+        <p:nvCxnSpPr>
+          <p:cNvPr id="26" name="Gerader Verbinder 25">
+            <a:extLst>
+              <a:ext uri="{FF2B5EF4-FFF2-40B4-BE49-F238E27FC236}">
+                <a16:creationId xmlns:a16="http://schemas.microsoft.com/office/drawing/2014/main" id="{D3F36781-DBAB-45AF-B08B-B6A47AF7C6FF}"/>
+              </a:ext>
+            </a:extLst>
+          </p:cNvPr>
+          <p:cNvCxnSpPr>
+            <a:cxnSpLocks/>
+          </p:cNvCxnSpPr>
+          <p:nvPr/>
+        </p:nvCxnSpPr>
+        <p:spPr>
+          <a:xfrm>
+            <a:off x="5929890" y="2863041"/>
+            <a:ext cx="5926750" cy="0"/>
+          </a:xfrm>
+          <a:prstGeom prst="line">
+            <a:avLst/>
+          </a:prstGeom>
+        </p:spPr>
+        <p:style>
+          <a:lnRef idx="1">
+            <a:schemeClr val="accent1"/>
+          </a:lnRef>
+          <a:fillRef idx="0">
+            <a:schemeClr val="accent1"/>
+          </a:fillRef>
+          <a:effectRef idx="0">
+            <a:schemeClr val="accent1"/>
+          </a:effectRef>
+          <a:fontRef idx="minor">
+            <a:schemeClr val="tx1"/>
+          </a:fontRef>
+        </p:style>
+      </p:cxnSp>
+      <p:pic>
+        <p:nvPicPr>
+          <p:cNvPr id="33" name="Grafik 32">
+            <a:extLst>
+              <a:ext uri="{FF2B5EF4-FFF2-40B4-BE49-F238E27FC236}">
+                <a16:creationId xmlns:a16="http://schemas.microsoft.com/office/drawing/2014/main" id="{C4EC4BB8-5877-469B-8AE9-A58F6AC7CAD0}"/>
+              </a:ext>
+            </a:extLst>
+          </p:cNvPr>
+          <p:cNvPicPr>
+            <a:picLocks noChangeAspect="1"/>
+          </p:cNvPicPr>
+          <p:nvPr/>
+        </p:nvPicPr>
+        <p:blipFill>
+          <a:blip r:embed="rId6">
+            <a:extLst>
+              <a:ext uri="{28A0092B-C50C-407E-A947-70E740481C1C}">
+                <a14:useLocalDpi xmlns:a14="http://schemas.microsoft.com/office/drawing/2010/main" val="0"/>
+              </a:ext>
+              <a:ext uri="{96DAC541-7B7A-43D3-8B79-37D633B846F1}">
+                <asvg:svgBlip xmlns:asvg="http://schemas.microsoft.com/office/drawing/2016/SVG/main" r:embed="rId7"/>
+              </a:ext>
+            </a:extLst>
+          </a:blip>
+          <a:stretch>
+            <a:fillRect/>
+          </a:stretch>
+        </p:blipFill>
+        <p:spPr>
+          <a:xfrm>
+            <a:off x="4799856" y="4797152"/>
+            <a:ext cx="95250" cy="95250"/>
+          </a:xfrm>
+          <a:prstGeom prst="rect">
+            <a:avLst/>
+          </a:prstGeom>
+        </p:spPr>
+      </p:pic>
+      <p:sp>
+        <p:nvSpPr>
+          <p:cNvPr id="34" name="Gleichschenkliges Dreieck 33">
+            <a:extLst>
+              <a:ext uri="{FF2B5EF4-FFF2-40B4-BE49-F238E27FC236}">
+                <a16:creationId xmlns:a16="http://schemas.microsoft.com/office/drawing/2014/main" id="{47E503F2-B984-425B-913B-94AFEBF71D25}"/>
+              </a:ext>
+            </a:extLst>
+          </p:cNvPr>
+          <p:cNvSpPr/>
+          <p:nvPr/>
+        </p:nvSpPr>
+        <p:spPr>
+          <a:xfrm rot="5400000">
+            <a:off x="5715358" y="4204786"/>
+            <a:ext cx="239798" cy="187929"/>
+          </a:xfrm>
+          <a:prstGeom prst="triangle">
+            <a:avLst/>
+          </a:prstGeom>
+          <a:solidFill>
+            <a:srgbClr val="C00000"/>
+          </a:solidFill>
+          <a:ln>
+            <a:noFill/>
+          </a:ln>
+        </p:spPr>
+        <p:style>
+          <a:lnRef idx="2">
+            <a:schemeClr val="accent1">
+              <a:shade val="50000"/>
+            </a:schemeClr>
+          </a:lnRef>
+          <a:fillRef idx="1">
+            <a:schemeClr val="accent1"/>
+          </a:fillRef>
+          <a:effectRef idx="0">
+            <a:schemeClr val="accent1"/>
+          </a:effectRef>
+          <a:fontRef idx="minor">
+            <a:schemeClr val="lt1"/>
+          </a:fontRef>
+        </p:style>
+        <p:txBody>
+          <a:bodyPr rtlCol="0" anchor="ctr"/>
+          <a:lstStyle/>
+          <a:p>
+            <a:pPr algn="ctr"/>
+            <a:endParaRPr lang="de-DE"/>
+          </a:p>
+        </p:txBody>
+      </p:sp>
+    </p:spTree>
+    <p:extLst>
+      <p:ext uri="{BB962C8B-B14F-4D97-AF65-F5344CB8AC3E}">
+        <p14:creationId xmlns:p14="http://schemas.microsoft.com/office/powerpoint/2010/main" val="3235568506"/>
+      </p:ext>
+    </p:extLst>
+  </p:cSld>
+  <p:clrMapOvr>
+    <a:masterClrMapping/>
+  </p:clrMapOvr>
+  <p:timing>
+    <p:tnLst>
+      <p:par>
+        <p:cTn id="1" dur="indefinite" restart="never" nodeType="tmRoot">
+          <p:childTnLst>
+            <p:seq concurrent="1" nextAc="seek">
+              <p:cTn id="2" dur="indefinite" nodeType="mainSeq">
+                <p:childTnLst>
+                  <p:par>
+                    <p:cTn id="3" fill="hold">
+                      <p:stCondLst>
+                        <p:cond delay="indefinite"/>
+                      </p:stCondLst>
+                      <p:childTnLst>
+                        <p:par>
+                          <p:cTn id="4" fill="hold">
+                            <p:stCondLst>
+                              <p:cond delay="0"/>
+                            </p:stCondLst>
+                            <p:childTnLst>
+                              <p:par>
+                                <p:cTn id="5" presetID="1" presetClass="entr" presetSubtype="0" fill="hold" grpId="0" nodeType="clickEffect">
+                                  <p:stCondLst>
+                                    <p:cond delay="0"/>
+                                  </p:stCondLst>
+                                  <p:childTnLst>
+                                    <p:set>
+                                      <p:cBhvr>
+                                        <p:cTn id="6" dur="1" fill="hold">
+                                          <p:stCondLst>
+                                            <p:cond delay="0"/>
+                                          </p:stCondLst>
+                                        </p:cTn>
+                                        <p:tgtEl>
+                                          <p:spTgt spid="24">
+                                            <p:txEl>
+                                              <p:pRg st="0" end="0"/>
+                                            </p:txEl>
+                                          </p:spTgt>
+                                        </p:tgtEl>
+                                        <p:attrNameLst>
+                                          <p:attrName>style.visibility</p:attrName>
+                                        </p:attrNameLst>
+                                      </p:cBhvr>
+                                      <p:to>
+                                        <p:strVal val="visible"/>
+                                      </p:to>
+                                    </p:set>
+                                  </p:childTnLst>
+                                </p:cTn>
+                              </p:par>
+                              <p:par>
+                                <p:cTn id="7" presetID="1" presetClass="entr" presetSubtype="0" fill="hold" nodeType="withEffect">
+                                  <p:stCondLst>
+                                    <p:cond delay="0"/>
+                                  </p:stCondLst>
+                                  <p:childTnLst>
+                                    <p:set>
+                                      <p:cBhvr>
+                                        <p:cTn id="8" dur="1" fill="hold">
+                                          <p:stCondLst>
+                                            <p:cond delay="0"/>
+                                          </p:stCondLst>
+                                        </p:cTn>
+                                        <p:tgtEl>
+                                          <p:spTgt spid="9"/>
+                                        </p:tgtEl>
+                                        <p:attrNameLst>
+                                          <p:attrName>style.visibility</p:attrName>
+                                        </p:attrNameLst>
+                                      </p:cBhvr>
+                                      <p:to>
+                                        <p:strVal val="visible"/>
+                                      </p:to>
+                                    </p:set>
+                                  </p:childTnLst>
+                                </p:cTn>
+                              </p:par>
+                            </p:childTnLst>
+                          </p:cTn>
+                        </p:par>
+                      </p:childTnLst>
+                    </p:cTn>
+                  </p:par>
+                  <p:par>
+                    <p:cTn id="9" fill="hold">
+                      <p:stCondLst>
+                        <p:cond delay="indefinite"/>
+                      </p:stCondLst>
+                      <p:childTnLst>
+                        <p:par>
+                          <p:cTn id="10" fill="hold">
+                            <p:stCondLst>
+                              <p:cond delay="0"/>
+                            </p:stCondLst>
+                            <p:childTnLst>
+                              <p:par>
+                                <p:cTn id="11" presetID="1" presetClass="entr" presetSubtype="0" fill="hold" grpId="0" nodeType="clickEffect">
+                                  <p:stCondLst>
+                                    <p:cond delay="0"/>
+                                  </p:stCondLst>
+                                  <p:childTnLst>
+                                    <p:set>
+                                      <p:cBhvr>
+                                        <p:cTn id="12" dur="1" fill="hold">
+                                          <p:stCondLst>
+                                            <p:cond delay="0"/>
+                                          </p:stCondLst>
+                                        </p:cTn>
+                                        <p:tgtEl>
+                                          <p:spTgt spid="24">
+                                            <p:txEl>
+                                              <p:pRg st="1" end="1"/>
+                                            </p:txEl>
+                                          </p:spTgt>
+                                        </p:tgtEl>
+                                        <p:attrNameLst>
+                                          <p:attrName>style.visibility</p:attrName>
+                                        </p:attrNameLst>
+                                      </p:cBhvr>
+                                      <p:to>
+                                        <p:strVal val="visible"/>
+                                      </p:to>
+                                    </p:set>
+                                  </p:childTnLst>
+                                </p:cTn>
+                              </p:par>
+                              <p:par>
+                                <p:cTn id="13" presetID="1" presetClass="entr" presetSubtype="0" fill="hold" nodeType="withEffect">
+                                  <p:stCondLst>
+                                    <p:cond delay="0"/>
+                                  </p:stCondLst>
+                                  <p:childTnLst>
+                                    <p:set>
+                                      <p:cBhvr>
+                                        <p:cTn id="14" dur="1" fill="hold">
+                                          <p:stCondLst>
+                                            <p:cond delay="0"/>
+                                          </p:stCondLst>
+                                        </p:cTn>
+                                        <p:tgtEl>
+                                          <p:spTgt spid="33"/>
+                                        </p:tgtEl>
+                                        <p:attrNameLst>
+                                          <p:attrName>style.visibility</p:attrName>
+                                        </p:attrNameLst>
+                                      </p:cBhvr>
+                                      <p:to>
+                                        <p:strVal val="visible"/>
+                                      </p:to>
+                                    </p:set>
+                                  </p:childTnLst>
+                                </p:cTn>
+                              </p:par>
+                            </p:childTnLst>
+                          </p:cTn>
+                        </p:par>
+                      </p:childTnLst>
+                    </p:cTn>
+                  </p:par>
+                  <p:par>
+                    <p:cTn id="15" fill="hold">
+                      <p:stCondLst>
+                        <p:cond delay="indefinite"/>
+                      </p:stCondLst>
+                      <p:childTnLst>
+                        <p:par>
+                          <p:cTn id="16" fill="hold">
+                            <p:stCondLst>
+                              <p:cond delay="0"/>
+                            </p:stCondLst>
+                            <p:childTnLst>
+                              <p:par>
+                                <p:cTn id="17" presetID="1" presetClass="entr" presetSubtype="0" fill="hold" grpId="0" nodeType="clickEffect">
+                                  <p:stCondLst>
+                                    <p:cond delay="0"/>
+                                  </p:stCondLst>
+                                  <p:childTnLst>
+                                    <p:set>
+                                      <p:cBhvr>
+                                        <p:cTn id="18" dur="1" fill="hold">
+                                          <p:stCondLst>
+                                            <p:cond delay="0"/>
+                                          </p:stCondLst>
+                                        </p:cTn>
+                                        <p:tgtEl>
+                                          <p:spTgt spid="34"/>
+                                        </p:tgtEl>
+                                        <p:attrNameLst>
+                                          <p:attrName>style.visibility</p:attrName>
+                                        </p:attrNameLst>
+                                      </p:cBhvr>
+                                      <p:to>
+                                        <p:strVal val="visible"/>
+                                      </p:to>
+                                    </p:set>
+                                  </p:childTnLst>
+                                </p:cTn>
+                              </p:par>
+                            </p:childTnLst>
+                          </p:cTn>
+                        </p:par>
+                      </p:childTnLst>
+                    </p:cTn>
+                  </p:par>
+                </p:childTnLst>
+              </p:cTn>
+              <p:prevCondLst>
+                <p:cond evt="onPrev" delay="0">
+                  <p:tgtEl>
+                    <p:sldTgt/>
+                  </p:tgtEl>
+                </p:cond>
+              </p:prevCondLst>
+              <p:nextCondLst>
+                <p:cond evt="onNext" delay="0">
+                  <p:tgtEl>
+                    <p:sldTgt/>
+                  </p:tgtEl>
+                </p:cond>
+              </p:nextCondLst>
+            </p:seq>
+          </p:childTnLst>
+        </p:cTn>
+      </p:par>
+    </p:tnLst>
+    <p:bldLst>
+      <p:bldP spid="24" grpId="0" uiExpand="1" build="p"/>
+      <p:bldP spid="34" grpId="0" animBg="1"/>
+    </p:bldLst>
+  </p:timing>
+</p:sld>
+</file>
+
+<file path=ppt/slides/slide5.xml><?xml version="1.0" encoding="utf-8"?>
+<p:sld xmlns:a="http://schemas.openxmlformats.org/drawingml/2006/main" xmlns:r="http://schemas.openxmlformats.org/officeDocument/2006/relationships" xmlns:p="http://schemas.openxmlformats.org/presentationml/2006/main">
+  <p:cSld>
+    <p:spTree>
+      <p:nvGrpSpPr>
+        <p:cNvPr id="1" name=""/>
+        <p:cNvGrpSpPr/>
+        <p:nvPr/>
+      </p:nvGrpSpPr>
+      <p:grpSpPr>
+        <a:xfrm>
+          <a:off x="0" y="0"/>
+          <a:ext cx="0" cy="0"/>
+          <a:chOff x="0" y="0"/>
+          <a:chExt cx="0" cy="0"/>
+        </a:xfrm>
+      </p:grpSpPr>
+      <p:sp>
+        <p:nvSpPr>
+          <p:cNvPr id="2" name="Titel 1">
+            <a:extLst>
+              <a:ext uri="{FF2B5EF4-FFF2-40B4-BE49-F238E27FC236}">
+                <a16:creationId xmlns:a16="http://schemas.microsoft.com/office/drawing/2014/main" id="{ED5F712F-99D6-4719-A4F7-53E71104747E}"/>
+              </a:ext>
+            </a:extLst>
+          </p:cNvPr>
+          <p:cNvSpPr>
+            <a:spLocks noGrp="1"/>
+          </p:cNvSpPr>
+          <p:nvPr>
+            <p:ph type="title"/>
+          </p:nvPr>
+        </p:nvSpPr>
+        <p:spPr/>
+        <p:txBody>
+          <a:bodyPr/>
+          <a:lstStyle/>
+          <a:p>
+            <a:r>
+              <a:rPr lang="de-DE" dirty="0"/>
+              <a:t>FABOLAS</a:t>
+            </a:r>
+          </a:p>
+        </p:txBody>
+      </p:sp>
+      <p:sp>
+        <p:nvSpPr>
+          <p:cNvPr id="3" name="Datumsplatzhalter 2">
+            <a:extLst>
+              <a:ext uri="{FF2B5EF4-FFF2-40B4-BE49-F238E27FC236}">
+                <a16:creationId xmlns:a16="http://schemas.microsoft.com/office/drawing/2014/main" id="{314A6C1D-C455-4565-AD15-C483C04C94B7}"/>
+              </a:ext>
+            </a:extLst>
+          </p:cNvPr>
+          <p:cNvSpPr>
+            <a:spLocks noGrp="1"/>
+          </p:cNvSpPr>
+          <p:nvPr>
+            <p:ph type="dt" sz="half" idx="10"/>
+          </p:nvPr>
+        </p:nvSpPr>
+        <p:spPr/>
+        <p:txBody>
+          <a:bodyPr/>
+          <a:lstStyle/>
+          <a:p>
+            <a:r>
+              <a:rPr lang="de-DE" dirty="0"/>
+              <a:t>28.11.2018</a:t>
+            </a:r>
+          </a:p>
+        </p:txBody>
+      </p:sp>
+      <p:sp>
+        <p:nvSpPr>
+          <p:cNvPr id="4" name="Fußzeilenplatzhalter 3">
+            <a:extLst>
+              <a:ext uri="{FF2B5EF4-FFF2-40B4-BE49-F238E27FC236}">
+                <a16:creationId xmlns:a16="http://schemas.microsoft.com/office/drawing/2014/main" id="{D1566B7C-BA1A-4778-8CBF-15AFB2C203F6}"/>
+              </a:ext>
+            </a:extLst>
+          </p:cNvPr>
+          <p:cNvSpPr>
+            <a:spLocks noGrp="1"/>
+          </p:cNvSpPr>
+          <p:nvPr>
+            <p:ph type="ftr" sz="quarter" idx="11"/>
+          </p:nvPr>
+        </p:nvSpPr>
+        <p:spPr/>
+        <p:txBody>
+          <a:bodyPr/>
+          <a:lstStyle/>
+          <a:p>
+            <a:r>
+              <a:rPr lang="en-US" dirty="0"/>
+              <a:t>Classification in Big Data Environments</a:t>
+            </a:r>
+          </a:p>
+        </p:txBody>
+      </p:sp>
+      <p:sp>
+        <p:nvSpPr>
+          <p:cNvPr id="5" name="Foliennummernplatzhalter 4">
+            <a:extLst>
+              <a:ext uri="{FF2B5EF4-FFF2-40B4-BE49-F238E27FC236}">
+                <a16:creationId xmlns:a16="http://schemas.microsoft.com/office/drawing/2014/main" id="{CCAB178F-8D01-4C85-9964-DFC128D83FA1}"/>
+              </a:ext>
+            </a:extLst>
+          </p:cNvPr>
+          <p:cNvSpPr>
+            <a:spLocks noGrp="1"/>
+          </p:cNvSpPr>
+          <p:nvPr>
+            <p:ph type="sldNum" sz="quarter" idx="12"/>
+          </p:nvPr>
+        </p:nvSpPr>
+        <p:spPr/>
+        <p:txBody>
+          <a:bodyPr/>
+          <a:lstStyle/>
+          <a:p>
+            <a:fld id="{F4DAF760-8A09-427D-9634-9AF01F07ABD5}" type="slidenum">
+              <a:rPr lang="de-DE" smtClean="0"/>
+              <a:pPr/>
+              <a:t>5</a:t>
+            </a:fld>
+            <a:endParaRPr lang="de-DE" dirty="0"/>
+          </a:p>
+        </p:txBody>
+      </p:sp>
+    </p:spTree>
+    <p:extLst>
+      <p:ext uri="{BB962C8B-B14F-4D97-AF65-F5344CB8AC3E}">
+        <p14:creationId xmlns:p14="http://schemas.microsoft.com/office/powerpoint/2010/main" val="2968017310"/>
+      </p:ext>
+    </p:extLst>
+  </p:cSld>
+  <p:clrMapOvr>
+    <a:masterClrMapping/>
+  </p:clrMapOvr>
+</p:sld>
+</file>
+
+<file path=ppt/slides/slide6.xml><?xml version="1.0" encoding="utf-8"?>
+<p:sld xmlns:a="http://schemas.openxmlformats.org/drawingml/2006/main" xmlns:r="http://schemas.openxmlformats.org/officeDocument/2006/relationships" xmlns:p="http://schemas.openxmlformats.org/presentationml/2006/main">
+  <p:cSld>
+    <p:spTree>
+      <p:nvGrpSpPr>
+        <p:cNvPr id="1" name=""/>
+        <p:cNvGrpSpPr/>
+        <p:nvPr/>
+      </p:nvGrpSpPr>
+      <p:grpSpPr>
+        <a:xfrm>
+          <a:off x="0" y="0"/>
+          <a:ext cx="0" cy="0"/>
+          <a:chOff x="0" y="0"/>
+          <a:chExt cx="0" cy="0"/>
+        </a:xfrm>
+      </p:grpSpPr>
+      <p:sp>
+        <p:nvSpPr>
+          <p:cNvPr id="2" name="Titel 1">
+            <a:extLst>
+              <a:ext uri="{FF2B5EF4-FFF2-40B4-BE49-F238E27FC236}">
+                <a16:creationId xmlns:a16="http://schemas.microsoft.com/office/drawing/2014/main" id="{C902A17B-D96B-4443-AD76-D7AE4FAC4350}"/>
+              </a:ext>
+            </a:extLst>
+          </p:cNvPr>
+          <p:cNvSpPr>
+            <a:spLocks noGrp="1"/>
+          </p:cNvSpPr>
+          <p:nvPr>
+            <p:ph type="title"/>
+          </p:nvPr>
+        </p:nvSpPr>
+        <p:spPr/>
+        <p:txBody>
+          <a:bodyPr/>
+          <a:lstStyle/>
+          <a:p>
+            <a:r>
+              <a:rPr lang="en-US" dirty="0"/>
+              <a:t>Hyperparameter</a:t>
+            </a:r>
+            <a:r>
+              <a:rPr lang="de-DE" dirty="0"/>
+              <a:t> </a:t>
+            </a:r>
+            <a:r>
+              <a:rPr lang="en-US" dirty="0"/>
+              <a:t>Optimization</a:t>
+            </a:r>
+          </a:p>
+        </p:txBody>
+      </p:sp>
+      <p:sp>
+        <p:nvSpPr>
+          <p:cNvPr id="3" name="Datumsplatzhalter 2">
+            <a:extLst>
+              <a:ext uri="{FF2B5EF4-FFF2-40B4-BE49-F238E27FC236}">
+                <a16:creationId xmlns:a16="http://schemas.microsoft.com/office/drawing/2014/main" id="{D1423DE6-9403-43A4-B33F-C7E247881FBA}"/>
+              </a:ext>
+            </a:extLst>
+          </p:cNvPr>
+          <p:cNvSpPr>
+            <a:spLocks noGrp="1"/>
+          </p:cNvSpPr>
+          <p:nvPr>
+            <p:ph type="dt" sz="half" idx="10"/>
+          </p:nvPr>
+        </p:nvSpPr>
+        <p:spPr/>
+        <p:txBody>
+          <a:bodyPr/>
+          <a:lstStyle/>
+          <a:p>
+            <a:r>
+              <a:rPr lang="de-DE" dirty="0"/>
+              <a:t>28.11.2018</a:t>
+            </a:r>
+          </a:p>
+        </p:txBody>
+      </p:sp>
+      <p:sp>
+        <p:nvSpPr>
+          <p:cNvPr id="4" name="Fußzeilenplatzhalter 3">
+            <a:extLst>
+              <a:ext uri="{FF2B5EF4-FFF2-40B4-BE49-F238E27FC236}">
+                <a16:creationId xmlns:a16="http://schemas.microsoft.com/office/drawing/2014/main" id="{822FFDE0-B215-4059-A8CF-4B2B0FA8FF9D}"/>
+              </a:ext>
+            </a:extLst>
+          </p:cNvPr>
+          <p:cNvSpPr>
+            <a:spLocks noGrp="1"/>
+          </p:cNvSpPr>
+          <p:nvPr>
+            <p:ph type="ftr" sz="quarter" idx="11"/>
+          </p:nvPr>
+        </p:nvSpPr>
+        <p:spPr/>
+        <p:txBody>
+          <a:bodyPr/>
+          <a:lstStyle/>
+          <a:p>
+            <a:r>
+              <a:rPr lang="en-US" dirty="0"/>
+              <a:t>Classification in Big Data Environments</a:t>
+            </a:r>
+          </a:p>
+        </p:txBody>
+      </p:sp>
+      <p:sp>
+        <p:nvSpPr>
+          <p:cNvPr id="5" name="Foliennummernplatzhalter 4">
+            <a:extLst>
+              <a:ext uri="{FF2B5EF4-FFF2-40B4-BE49-F238E27FC236}">
+                <a16:creationId xmlns:a16="http://schemas.microsoft.com/office/drawing/2014/main" id="{33FFFF87-A9E5-43F3-ADF5-BB2298A0AE4E}"/>
+              </a:ext>
+            </a:extLst>
+          </p:cNvPr>
+          <p:cNvSpPr>
+            <a:spLocks noGrp="1"/>
+          </p:cNvSpPr>
+          <p:nvPr>
+            <p:ph type="sldNum" sz="quarter" idx="12"/>
+          </p:nvPr>
+        </p:nvSpPr>
+        <p:spPr/>
+        <p:txBody>
+          <a:bodyPr/>
+          <a:lstStyle/>
+          <a:p>
+            <a:fld id="{F4DAF760-8A09-427D-9634-9AF01F07ABD5}" type="slidenum">
+              <a:rPr lang="de-DE" smtClean="0"/>
+              <a:pPr/>
+              <a:t>6</a:t>
+            </a:fld>
+            <a:endParaRPr lang="de-DE" dirty="0"/>
+          </a:p>
+        </p:txBody>
+      </p:sp>
+      <p:pic>
+        <p:nvPicPr>
+          <p:cNvPr id="15" name="Grafik 14">
+            <a:extLst>
+              <a:ext uri="{FF2B5EF4-FFF2-40B4-BE49-F238E27FC236}">
+                <a16:creationId xmlns:a16="http://schemas.microsoft.com/office/drawing/2014/main" id="{EFE8CC7F-1DBE-4B4B-8574-C95187B5B7A1}"/>
+              </a:ext>
+            </a:extLst>
+          </p:cNvPr>
+          <p:cNvPicPr>
+            <a:picLocks noChangeAspect="1"/>
+          </p:cNvPicPr>
+          <p:nvPr/>
+        </p:nvPicPr>
+        <p:blipFill>
+          <a:blip r:embed="rId2">
+            <a:extLst>
+              <a:ext uri="{28A0092B-C50C-407E-A947-70E740481C1C}">
+                <a14:useLocalDpi xmlns:a14="http://schemas.microsoft.com/office/drawing/2010/main" val="0"/>
+              </a:ext>
+              <a:ext uri="{96DAC541-7B7A-43D3-8B79-37D633B846F1}">
+                <asvg:svgBlip xmlns:asvg="http://schemas.microsoft.com/office/drawing/2016/SVG/main" r:embed="rId3"/>
+              </a:ext>
+            </a:extLst>
+          </a:blip>
+          <a:stretch>
+            <a:fillRect/>
+          </a:stretch>
+        </p:blipFill>
+        <p:spPr>
+          <a:xfrm>
+            <a:off x="767408" y="1206248"/>
+            <a:ext cx="4762500" cy="4762500"/>
+          </a:xfrm>
+          <a:prstGeom prst="rect">
+            <a:avLst/>
+          </a:prstGeom>
+        </p:spPr>
+      </p:pic>
+      <p:sp>
+        <p:nvSpPr>
+          <p:cNvPr id="14" name="Textfeld 13">
+            <a:extLst>
+              <a:ext uri="{FF2B5EF4-FFF2-40B4-BE49-F238E27FC236}">
+                <a16:creationId xmlns:a16="http://schemas.microsoft.com/office/drawing/2014/main" id="{5304EBB5-33C3-4D2C-AEA3-B00F3ADC23B3}"/>
+              </a:ext>
+            </a:extLst>
+          </p:cNvPr>
+          <p:cNvSpPr txBox="1"/>
+          <p:nvPr/>
+        </p:nvSpPr>
+        <p:spPr>
+          <a:xfrm>
+            <a:off x="6038765" y="2204864"/>
+            <a:ext cx="5440004" cy="523220"/>
+          </a:xfrm>
+          <a:prstGeom prst="rect">
+            <a:avLst/>
+          </a:prstGeom>
+          <a:noFill/>
+        </p:spPr>
+        <p:txBody>
+          <a:bodyPr wrap="square" rtlCol="0">
+            <a:spAutoFit/>
+          </a:bodyPr>
+          <a:lstStyle/>
+          <a:p>
+            <a:pPr algn="ctr"/>
+            <a:r>
+              <a:rPr lang="en-US" sz="2800" b="1" dirty="0">
+                <a:latin typeface="Roboto Light" panose="020B0604020202020204" charset="0"/>
+                <a:ea typeface="Roboto Light" panose="020B0604020202020204" charset="0"/>
+              </a:rPr>
+              <a:t>Optimization Ideas:</a:t>
+            </a:r>
+          </a:p>
+        </p:txBody>
+      </p:sp>
+      <p:pic>
+        <p:nvPicPr>
+          <p:cNvPr id="9" name="Grafik 8">
+            <a:extLst>
+              <a:ext uri="{FF2B5EF4-FFF2-40B4-BE49-F238E27FC236}">
+                <a16:creationId xmlns:a16="http://schemas.microsoft.com/office/drawing/2014/main" id="{350FF788-5D34-46F3-8198-59FE95FF9A1B}"/>
+              </a:ext>
+            </a:extLst>
+          </p:cNvPr>
+          <p:cNvPicPr>
+            <a:picLocks noChangeAspect="1"/>
+          </p:cNvPicPr>
+          <p:nvPr/>
+        </p:nvPicPr>
+        <p:blipFill>
+          <a:blip r:embed="rId4">
+            <a:extLst>
+              <a:ext uri="{28A0092B-C50C-407E-A947-70E740481C1C}">
+                <a14:useLocalDpi xmlns:a14="http://schemas.microsoft.com/office/drawing/2010/main" val="0"/>
+              </a:ext>
+              <a:ext uri="{96DAC541-7B7A-43D3-8B79-37D633B846F1}">
+                <asvg:svgBlip xmlns:asvg="http://schemas.microsoft.com/office/drawing/2016/SVG/main" r:embed="rId5"/>
+              </a:ext>
+            </a:extLst>
+          </a:blip>
+          <a:stretch>
+            <a:fillRect/>
+          </a:stretch>
+        </p:blipFill>
+        <p:spPr>
+          <a:xfrm>
+            <a:off x="767408" y="1206248"/>
+            <a:ext cx="4762500" cy="4762500"/>
+          </a:xfrm>
+          <a:prstGeom prst="rect">
+            <a:avLst/>
+          </a:prstGeom>
+        </p:spPr>
+      </p:pic>
+      <p:sp>
+        <p:nvSpPr>
+          <p:cNvPr id="24" name="Textfeld 23">
+            <a:extLst>
+              <a:ext uri="{FF2B5EF4-FFF2-40B4-BE49-F238E27FC236}">
+                <a16:creationId xmlns:a16="http://schemas.microsoft.com/office/drawing/2014/main" id="{68C3923E-0555-4233-AB2C-6BF2AD9FB2CA}"/>
+              </a:ext>
+            </a:extLst>
+          </p:cNvPr>
+          <p:cNvSpPr txBox="1"/>
+          <p:nvPr/>
+        </p:nvSpPr>
+        <p:spPr>
+          <a:xfrm>
+            <a:off x="5929890" y="2708240"/>
+            <a:ext cx="5094664" cy="1918474"/>
+          </a:xfrm>
+          <a:prstGeom prst="rect">
+            <a:avLst/>
+          </a:prstGeom>
+          <a:noFill/>
+        </p:spPr>
+        <p:txBody>
+          <a:bodyPr wrap="none" rtlCol="0">
+            <a:spAutoFit/>
+          </a:bodyPr>
+          <a:lstStyle/>
+          <a:p>
+            <a:pPr>
+              <a:lnSpc>
+                <a:spcPct val="200000"/>
+              </a:lnSpc>
+            </a:pPr>
+            <a:r>
+              <a:rPr lang="en-US" sz="3200" dirty="0">
+                <a:latin typeface="Roboto Light" panose="020B0604020202020204" charset="0"/>
+                <a:ea typeface="Roboto Light" panose="020B0604020202020204" charset="0"/>
+              </a:rPr>
+              <a:t>FABOLAS</a:t>
+            </a:r>
+          </a:p>
+          <a:p>
+            <a:pPr>
+              <a:lnSpc>
+                <a:spcPct val="200000"/>
+              </a:lnSpc>
+            </a:pPr>
+            <a:r>
+              <a:rPr lang="en-US" sz="3200" dirty="0">
+                <a:latin typeface="Roboto Light" panose="020B0604020202020204" charset="0"/>
+                <a:ea typeface="Roboto Light" panose="020B0604020202020204" charset="0"/>
+              </a:rPr>
+              <a:t>Terminate bad probes early</a:t>
+            </a:r>
+          </a:p>
+        </p:txBody>
+      </p:sp>
+      <p:pic>
+        <p:nvPicPr>
+          <p:cNvPr id="33" name="Grafik 32">
+            <a:extLst>
+              <a:ext uri="{FF2B5EF4-FFF2-40B4-BE49-F238E27FC236}">
+                <a16:creationId xmlns:a16="http://schemas.microsoft.com/office/drawing/2014/main" id="{C4EC4BB8-5877-469B-8AE9-A58F6AC7CAD0}"/>
+              </a:ext>
+            </a:extLst>
+          </p:cNvPr>
+          <p:cNvPicPr>
+            <a:picLocks noChangeAspect="1"/>
+          </p:cNvPicPr>
+          <p:nvPr/>
+        </p:nvPicPr>
+        <p:blipFill>
+          <a:blip r:embed="rId6">
+            <a:extLst>
+              <a:ext uri="{28A0092B-C50C-407E-A947-70E740481C1C}">
+                <a14:useLocalDpi xmlns:a14="http://schemas.microsoft.com/office/drawing/2010/main" val="0"/>
+              </a:ext>
+              <a:ext uri="{96DAC541-7B7A-43D3-8B79-37D633B846F1}">
+                <asvg:svgBlip xmlns:asvg="http://schemas.microsoft.com/office/drawing/2016/SVG/main" r:embed="rId7"/>
+              </a:ext>
+            </a:extLst>
+          </a:blip>
+          <a:stretch>
+            <a:fillRect/>
+          </a:stretch>
+        </p:blipFill>
+        <p:spPr>
+          <a:xfrm>
+            <a:off x="4799856" y="4797152"/>
+            <a:ext cx="95250" cy="95250"/>
+          </a:xfrm>
+          <a:prstGeom prst="rect">
+            <a:avLst/>
+          </a:prstGeom>
+        </p:spPr>
+      </p:pic>
+      <p:sp>
+        <p:nvSpPr>
+          <p:cNvPr id="34" name="Gleichschenkliges Dreieck 33">
+            <a:extLst>
+              <a:ext uri="{FF2B5EF4-FFF2-40B4-BE49-F238E27FC236}">
+                <a16:creationId xmlns:a16="http://schemas.microsoft.com/office/drawing/2014/main" id="{47E503F2-B984-425B-913B-94AFEBF71D25}"/>
+              </a:ext>
+            </a:extLst>
+          </p:cNvPr>
+          <p:cNvSpPr/>
+          <p:nvPr/>
+        </p:nvSpPr>
+        <p:spPr>
+          <a:xfrm rot="5400000">
+            <a:off x="5715358" y="3242260"/>
+            <a:ext cx="239798" cy="187929"/>
+          </a:xfrm>
+          <a:prstGeom prst="triangle">
+            <a:avLst/>
+          </a:prstGeom>
+          <a:solidFill>
+            <a:srgbClr val="C00000"/>
+          </a:solidFill>
+          <a:ln>
+            <a:noFill/>
+          </a:ln>
+        </p:spPr>
+        <p:style>
+          <a:lnRef idx="2">
+            <a:schemeClr val="accent1">
+              <a:shade val="50000"/>
+            </a:schemeClr>
+          </a:lnRef>
+          <a:fillRef idx="1">
+            <a:schemeClr val="accent1"/>
+          </a:fillRef>
+          <a:effectRef idx="0">
+            <a:schemeClr val="accent1"/>
+          </a:effectRef>
+          <a:fontRef idx="minor">
+            <a:schemeClr val="lt1"/>
+          </a:fontRef>
+        </p:style>
+        <p:txBody>
+          <a:bodyPr rtlCol="0" anchor="ctr"/>
+          <a:lstStyle/>
+          <a:p>
+            <a:pPr algn="ctr"/>
+            <a:endParaRPr lang="de-DE" dirty="0"/>
+          </a:p>
+        </p:txBody>
+      </p:sp>
+    </p:spTree>
+    <p:extLst>
+      <p:ext uri="{BB962C8B-B14F-4D97-AF65-F5344CB8AC3E}">
+        <p14:creationId xmlns:p14="http://schemas.microsoft.com/office/powerpoint/2010/main" val="4235737947"/>
+      </p:ext>
+    </p:extLst>
+  </p:cSld>
+  <p:clrMapOvr>
+    <a:masterClrMapping/>
+  </p:clrMapOvr>
+  <p:timing>
+    <p:tnLst>
+      <p:par>
+        <p:cTn id="1" dur="indefinite" restart="never" nodeType="tmRoot">
+          <p:childTnLst>
+            <p:seq concurrent="1" nextAc="seek">
+              <p:cTn id="2" dur="indefinite" nodeType="mainSeq">
+                <p:childTnLst>
+                  <p:par>
+                    <p:cTn id="3" fill="hold">
+                      <p:stCondLst>
+                        <p:cond delay="indefinite"/>
+                      </p:stCondLst>
+                      <p:childTnLst>
+                        <p:par>
+                          <p:cTn id="4" fill="hold">
+                            <p:stCondLst>
+                              <p:cond delay="0"/>
+                            </p:stCondLst>
+                            <p:childTnLst>
+                              <p:par>
+                                <p:cTn id="5" presetID="42" presetClass="path" presetSubtype="0" accel="50000" decel="50000" fill="hold" grpId="0" nodeType="clickEffect">
+                                  <p:stCondLst>
+                                    <p:cond delay="0"/>
+                                  </p:stCondLst>
+                                  <p:childTnLst>
+                                    <p:animMotion origin="layout" path="M 4.375E-6 -2.59259E-6 L 4.375E-6 0.14028 " pathEditMode="relative" rAng="0" ptsTypes="AA">
+                                      <p:cBhvr>
+                                        <p:cTn id="6" dur="250" fill="hold"/>
+                                        <p:tgtEl>
+                                          <p:spTgt spid="34"/>
+                                        </p:tgtEl>
+                                        <p:attrNameLst>
+                                          <p:attrName>ppt_x</p:attrName>
+                                          <p:attrName>ppt_y</p:attrName>
+                                        </p:attrNameLst>
+                                      </p:cBhvr>
+                                      <p:rCtr x="0" y="7014"/>
+                                    </p:animMotion>
+                                  </p:childTnLst>
+                                </p:cTn>
+                              </p:par>
+                            </p:childTnLst>
+                          </p:cTn>
+                        </p:par>
+                      </p:childTnLst>
+                    </p:cTn>
+                  </p:par>
+                </p:childTnLst>
+              </p:cTn>
+              <p:prevCondLst>
+                <p:cond evt="onPrev" delay="0">
+                  <p:tgtEl>
+                    <p:sldTgt/>
+                  </p:tgtEl>
+                </p:cond>
+              </p:prevCondLst>
+              <p:nextCondLst>
+                <p:cond evt="onNext" delay="0">
+                  <p:tgtEl>
+                    <p:sldTgt/>
+                  </p:tgtEl>
+                </p:cond>
+              </p:nextCondLst>
+            </p:seq>
+          </p:childTnLst>
+        </p:cTn>
+      </p:par>
+    </p:tnLst>
+    <p:bldLst>
+      <p:bldP spid="34" grpId="0" animBg="1"/>
+    </p:bldLst>
+  </p:timing>
+</p:sld>
+</file>
+
+<file path=ppt/slides/slide7.xml><?xml version="1.0" encoding="utf-8"?>
+<p:sld xmlns:a="http://schemas.openxmlformats.org/drawingml/2006/main" xmlns:r="http://schemas.openxmlformats.org/officeDocument/2006/relationships" xmlns:p="http://schemas.openxmlformats.org/presentationml/2006/main">
+  <p:cSld>
+    <p:spTree>
+      <p:nvGrpSpPr>
+        <p:cNvPr id="1" name=""/>
+        <p:cNvGrpSpPr/>
+        <p:nvPr/>
+      </p:nvGrpSpPr>
+      <p:grpSpPr>
+        <a:xfrm>
+          <a:off x="0" y="0"/>
+          <a:ext cx="0" cy="0"/>
+          <a:chOff x="0" y="0"/>
+          <a:chExt cx="0" cy="0"/>
+        </a:xfrm>
+      </p:grpSpPr>
+      <p:sp>
+        <p:nvSpPr>
+          <p:cNvPr id="8" name="Inhaltsplatzhalter 7">
+            <a:extLst>
+              <a:ext uri="{FF2B5EF4-FFF2-40B4-BE49-F238E27FC236}">
+                <a16:creationId xmlns:a16="http://schemas.microsoft.com/office/drawing/2014/main" id="{60FD48A6-AEC9-491D-A1D4-17AC8AC102C5}"/>
+              </a:ext>
+            </a:extLst>
+          </p:cNvPr>
+          <p:cNvSpPr>
+            <a:spLocks noGrp="1"/>
+          </p:cNvSpPr>
+          <p:nvPr>
+            <p:ph idx="1"/>
+          </p:nvPr>
+        </p:nvSpPr>
+        <p:spPr>
+          <a:xfrm>
+            <a:off x="838200" y="1124745"/>
+            <a:ext cx="10515600" cy="4680520"/>
+          </a:xfrm>
+        </p:spPr>
+        <p:txBody>
+          <a:bodyPr anchor="ctr">
+            <a:normAutofit/>
+          </a:bodyPr>
+          <a:lstStyle/>
+          <a:p>
+            <a:pPr marL="0" indent="0" algn="ctr">
+              <a:lnSpc>
+                <a:spcPct val="250000"/>
+              </a:lnSpc>
+              <a:spcBef>
+                <a:spcPts val="0"/>
+              </a:spcBef>
+              <a:buNone/>
+            </a:pPr>
+            <a:r>
+              <a:rPr lang="en-US" b="1" dirty="0"/>
+              <a:t>Speedup via:</a:t>
+            </a:r>
+          </a:p>
+          <a:p>
+            <a:pPr marL="0" indent="0" algn="ctr">
+              <a:lnSpc>
+                <a:spcPct val="250000"/>
+              </a:lnSpc>
+              <a:spcBef>
+                <a:spcPts val="0"/>
+              </a:spcBef>
+              <a:buNone/>
+            </a:pPr>
+            <a:r>
+              <a:rPr lang="en-US" sz="3600" dirty="0"/>
+              <a:t>Hyperparameter Optimization</a:t>
+            </a:r>
+          </a:p>
+          <a:p>
+            <a:pPr marL="0" indent="0" algn="ctr">
+              <a:lnSpc>
+                <a:spcPct val="250000"/>
+              </a:lnSpc>
+              <a:spcBef>
+                <a:spcPts val="0"/>
+              </a:spcBef>
+              <a:buNone/>
+            </a:pPr>
+            <a:r>
+              <a:rPr lang="en-US" sz="3600" dirty="0"/>
+              <a:t>Optimizing Training</a:t>
+            </a:r>
+          </a:p>
+        </p:txBody>
+      </p:sp>
+      <p:sp>
+        <p:nvSpPr>
+          <p:cNvPr id="5" name="Datumsplatzhalter 4">
+            <a:extLst>
+              <a:ext uri="{FF2B5EF4-FFF2-40B4-BE49-F238E27FC236}">
+                <a16:creationId xmlns:a16="http://schemas.microsoft.com/office/drawing/2014/main" id="{B5D02EDC-C20A-4838-8D2D-CE6B1E9CBA4A}"/>
+              </a:ext>
+            </a:extLst>
+          </p:cNvPr>
+          <p:cNvSpPr>
+            <a:spLocks noGrp="1"/>
+          </p:cNvSpPr>
+          <p:nvPr>
+            <p:ph type="dt" sz="half" idx="10"/>
+          </p:nvPr>
+        </p:nvSpPr>
+        <p:spPr/>
+        <p:txBody>
+          <a:bodyPr/>
+          <a:lstStyle/>
+          <a:p>
+            <a:r>
+              <a:rPr lang="de-DE" dirty="0"/>
+              <a:t>28.11.2018</a:t>
+            </a:r>
+          </a:p>
+        </p:txBody>
+      </p:sp>
+      <p:sp>
+        <p:nvSpPr>
+          <p:cNvPr id="6" name="Fußzeilenplatzhalter 5">
+            <a:extLst>
+              <a:ext uri="{FF2B5EF4-FFF2-40B4-BE49-F238E27FC236}">
+                <a16:creationId xmlns:a16="http://schemas.microsoft.com/office/drawing/2014/main" id="{D815E852-3B76-42B9-95D2-C201A6A702F6}"/>
+              </a:ext>
+            </a:extLst>
+          </p:cNvPr>
+          <p:cNvSpPr>
+            <a:spLocks noGrp="1"/>
+          </p:cNvSpPr>
+          <p:nvPr>
+            <p:ph type="ftr" sz="quarter" idx="11"/>
+          </p:nvPr>
+        </p:nvSpPr>
+        <p:spPr/>
+        <p:txBody>
+          <a:bodyPr/>
+          <a:lstStyle/>
+          <a:p>
+            <a:r>
+              <a:rPr lang="en-US" dirty="0"/>
+              <a:t>Classification in Big Data Environments</a:t>
+            </a:r>
+          </a:p>
+        </p:txBody>
+      </p:sp>
+      <p:sp>
+        <p:nvSpPr>
+          <p:cNvPr id="7" name="Foliennummernplatzhalter 6">
+            <a:extLst>
+              <a:ext uri="{FF2B5EF4-FFF2-40B4-BE49-F238E27FC236}">
+                <a16:creationId xmlns:a16="http://schemas.microsoft.com/office/drawing/2014/main" id="{FFB95A85-EF0D-4093-8AF7-76A5616378CD}"/>
+              </a:ext>
+            </a:extLst>
+          </p:cNvPr>
+          <p:cNvSpPr>
+            <a:spLocks noGrp="1"/>
+          </p:cNvSpPr>
+          <p:nvPr>
+            <p:ph type="sldNum" sz="quarter" idx="12"/>
+          </p:nvPr>
+        </p:nvSpPr>
+        <p:spPr/>
+        <p:txBody>
+          <a:bodyPr/>
+          <a:lstStyle/>
+          <a:p>
+            <a:fld id="{F4DAF760-8A09-427D-9634-9AF01F07ABD5}" type="slidenum">
+              <a:rPr lang="de-DE" smtClean="0"/>
+              <a:t>7</a:t>
+            </a:fld>
+            <a:endParaRPr lang="de-DE" dirty="0"/>
+          </a:p>
+        </p:txBody>
+      </p:sp>
+      <p:sp>
+        <p:nvSpPr>
+          <p:cNvPr id="2" name="Titel 1">
+            <a:extLst>
+              <a:ext uri="{FF2B5EF4-FFF2-40B4-BE49-F238E27FC236}">
+                <a16:creationId xmlns:a16="http://schemas.microsoft.com/office/drawing/2014/main" id="{8093DC8F-5A69-4E46-9FB9-571634287E8B}"/>
+              </a:ext>
+            </a:extLst>
+          </p:cNvPr>
+          <p:cNvSpPr>
+            <a:spLocks noGrp="1"/>
+          </p:cNvSpPr>
+          <p:nvPr>
+            <p:ph type="title"/>
+          </p:nvPr>
+        </p:nvSpPr>
+        <p:spPr/>
+        <p:txBody>
+          <a:bodyPr/>
+          <a:lstStyle/>
+          <a:p>
+            <a:r>
+              <a:rPr lang="en-US" dirty="0"/>
+              <a:t>Overview</a:t>
+            </a:r>
+          </a:p>
+        </p:txBody>
+      </p:sp>
+      <p:sp>
+        <p:nvSpPr>
+          <p:cNvPr id="9" name="Gleichschenkliges Dreieck 8">
+            <a:extLst>
+              <a:ext uri="{FF2B5EF4-FFF2-40B4-BE49-F238E27FC236}">
+                <a16:creationId xmlns:a16="http://schemas.microsoft.com/office/drawing/2014/main" id="{70C16FE9-85F3-4CEF-B909-33D38F9A7B90}"/>
+              </a:ext>
+            </a:extLst>
+          </p:cNvPr>
+          <p:cNvSpPr/>
+          <p:nvPr/>
+        </p:nvSpPr>
+        <p:spPr>
+          <a:xfrm rot="5400000">
+            <a:off x="2609343" y="3467938"/>
+            <a:ext cx="360040" cy="282163"/>
+          </a:xfrm>
+          <a:prstGeom prst="triangle">
+            <a:avLst/>
+          </a:prstGeom>
+          <a:solidFill>
+            <a:srgbClr val="C00000"/>
+          </a:solidFill>
+          <a:ln>
+            <a:noFill/>
+          </a:ln>
+        </p:spPr>
+        <p:style>
+          <a:lnRef idx="2">
+            <a:schemeClr val="accent1">
+              <a:shade val="50000"/>
+            </a:schemeClr>
+          </a:lnRef>
+          <a:fillRef idx="1">
+            <a:schemeClr val="accent1"/>
+          </a:fillRef>
+          <a:effectRef idx="0">
+            <a:schemeClr val="accent1"/>
+          </a:effectRef>
+          <a:fontRef idx="minor">
+            <a:schemeClr val="lt1"/>
+          </a:fontRef>
+        </p:style>
+        <p:txBody>
+          <a:bodyPr rtlCol="0" anchor="ctr"/>
+          <a:lstStyle/>
+          <a:p>
+            <a:pPr algn="ctr"/>
+            <a:endParaRPr lang="de-DE"/>
+          </a:p>
+        </p:txBody>
+      </p:sp>
+    </p:spTree>
+    <p:extLst>
+      <p:ext uri="{BB962C8B-B14F-4D97-AF65-F5344CB8AC3E}">
+        <p14:creationId xmlns:p14="http://schemas.microsoft.com/office/powerpoint/2010/main" val="230872523"/>
+      </p:ext>
+    </p:extLst>
+  </p:cSld>
+  <p:clrMapOvr>
+    <a:masterClrMapping/>
+  </p:clrMapOvr>
+  <p:timing>
+    <p:tnLst>
+      <p:par>
+        <p:cTn id="1" dur="indefinite" restart="never" nodeType="tmRoot">
+          <p:childTnLst>
+            <p:seq concurrent="1" nextAc="seek">
+              <p:cTn id="2" dur="indefinite" nodeType="mainSeq">
+                <p:childTnLst>
+                  <p:par>
+                    <p:cTn id="3" fill="hold">
+                      <p:stCondLst>
+                        <p:cond delay="indefinite"/>
+                      </p:stCondLst>
+                      <p:childTnLst>
+                        <p:par>
+                          <p:cTn id="4" fill="hold">
+                            <p:stCondLst>
+                              <p:cond delay="0"/>
+                            </p:stCondLst>
+                            <p:childTnLst>
+                              <p:par>
+                                <p:cTn id="5" presetID="42" presetClass="path" presetSubtype="0" accel="50000" decel="50000" fill="hold" grpId="0" nodeType="clickEffect">
+                                  <p:stCondLst>
+                                    <p:cond delay="0"/>
+                                  </p:stCondLst>
+                                  <p:childTnLst>
+                                    <p:animMotion origin="layout" path="M 3.95833E-6 2.59259E-6 L 3.95833E-6 0.20046 " pathEditMode="relative" rAng="0" ptsTypes="AA">
+                                      <p:cBhvr>
+                                        <p:cTn id="6" dur="250" fill="hold"/>
+                                        <p:tgtEl>
+                                          <p:spTgt spid="9"/>
+                                        </p:tgtEl>
+                                        <p:attrNameLst>
+                                          <p:attrName>ppt_x</p:attrName>
+                                          <p:attrName>ppt_y</p:attrName>
+                                        </p:attrNameLst>
+                                      </p:cBhvr>
+                                      <p:rCtr x="0" y="10023"/>
+                                    </p:animMotion>
+                                  </p:childTnLst>
+                                </p:cTn>
+                              </p:par>
+                            </p:childTnLst>
+                          </p:cTn>
+                        </p:par>
+                      </p:childTnLst>
+                    </p:cTn>
+                  </p:par>
+                </p:childTnLst>
+              </p:cTn>
+              <p:prevCondLst>
+                <p:cond evt="onPrev" delay="0">
+                  <p:tgtEl>
+                    <p:sldTgt/>
+                  </p:tgtEl>
+                </p:cond>
+              </p:prevCondLst>
+              <p:nextCondLst>
+                <p:cond evt="onNext" delay="0">
+                  <p:tgtEl>
+                    <p:sldTgt/>
+                  </p:tgtEl>
+                </p:cond>
+              </p:nextCondLst>
+            </p:seq>
+          </p:childTnLst>
+        </p:cTn>
+      </p:par>
+    </p:tnLst>
+    <p:bldLst>
+      <p:bldP spid="9" grpId="0" animBg="1"/>
+    </p:bldLst>
+  </p:timing>
+</p:sld>
+</file>
+
+<file path=ppt/slides/slide8.xml><?xml version="1.0" encoding="utf-8"?>
+<p:sld xmlns:a="http://schemas.openxmlformats.org/drawingml/2006/main" xmlns:r="http://schemas.openxmlformats.org/officeDocument/2006/relationships" xmlns:p="http://schemas.openxmlformats.org/presentationml/2006/main">
+  <p:cSld>
+    <p:spTree>
+      <p:nvGrpSpPr>
+        <p:cNvPr id="1" name=""/>
+        <p:cNvGrpSpPr/>
+        <p:nvPr/>
+      </p:nvGrpSpPr>
+      <p:grpSpPr>
+        <a:xfrm>
+          <a:off x="0" y="0"/>
+          <a:ext cx="0" cy="0"/>
+          <a:chOff x="0" y="0"/>
+          <a:chExt cx="0" cy="0"/>
+        </a:xfrm>
+      </p:grpSpPr>
+      <p:sp>
+        <p:nvSpPr>
+          <p:cNvPr id="2" name="Titel 1">
+            <a:extLst>
+              <a:ext uri="{FF2B5EF4-FFF2-40B4-BE49-F238E27FC236}">
+                <a16:creationId xmlns:a16="http://schemas.microsoft.com/office/drawing/2014/main" id="{A455EF99-5E7E-4871-97A2-132690559075}"/>
+              </a:ext>
+            </a:extLst>
+          </p:cNvPr>
+          <p:cNvSpPr>
+            <a:spLocks noGrp="1"/>
+          </p:cNvSpPr>
+          <p:nvPr>
+            <p:ph type="title"/>
+          </p:nvPr>
+        </p:nvSpPr>
+        <p:spPr/>
+        <p:txBody>
+          <a:bodyPr/>
+          <a:lstStyle/>
+          <a:p>
+            <a:r>
+              <a:rPr lang="en-US" dirty="0"/>
+              <a:t>Optimizing Training</a:t>
+            </a:r>
+          </a:p>
+        </p:txBody>
+      </p:sp>
+      <p:sp>
+        <p:nvSpPr>
+          <p:cNvPr id="3" name="Datumsplatzhalter 2">
+            <a:extLst>
+              <a:ext uri="{FF2B5EF4-FFF2-40B4-BE49-F238E27FC236}">
+                <a16:creationId xmlns:a16="http://schemas.microsoft.com/office/drawing/2014/main" id="{12AC90F4-1A5B-4BFF-A916-F20F865191B2}"/>
+              </a:ext>
+            </a:extLst>
+          </p:cNvPr>
+          <p:cNvSpPr>
+            <a:spLocks noGrp="1"/>
+          </p:cNvSpPr>
+          <p:nvPr>
+            <p:ph type="dt" sz="half" idx="10"/>
+          </p:nvPr>
+        </p:nvSpPr>
+        <p:spPr/>
+        <p:txBody>
+          <a:bodyPr/>
+          <a:lstStyle/>
+          <a:p>
+            <a:r>
+              <a:rPr lang="de-DE"/>
+              <a:t>28.11.2018</a:t>
+            </a:r>
+            <a:endParaRPr lang="de-DE" dirty="0"/>
+          </a:p>
+        </p:txBody>
+      </p:sp>
+      <p:sp>
+        <p:nvSpPr>
+          <p:cNvPr id="4" name="Fußzeilenplatzhalter 3">
+            <a:extLst>
+              <a:ext uri="{FF2B5EF4-FFF2-40B4-BE49-F238E27FC236}">
+                <a16:creationId xmlns:a16="http://schemas.microsoft.com/office/drawing/2014/main" id="{FFAF08CD-0B4A-44B0-94CC-05501A7DFE50}"/>
+              </a:ext>
+            </a:extLst>
+          </p:cNvPr>
+          <p:cNvSpPr>
+            <a:spLocks noGrp="1"/>
+          </p:cNvSpPr>
+          <p:nvPr>
+            <p:ph type="ftr" sz="quarter" idx="11"/>
+          </p:nvPr>
+        </p:nvSpPr>
+        <p:spPr/>
+        <p:txBody>
+          <a:bodyPr/>
+          <a:lstStyle/>
+          <a:p>
+            <a:r>
+              <a:rPr lang="en-US"/>
+              <a:t>Classification in Big Data Environments</a:t>
+            </a:r>
+            <a:endParaRPr lang="en-US" dirty="0"/>
+          </a:p>
+        </p:txBody>
+      </p:sp>
+      <p:sp>
+        <p:nvSpPr>
+          <p:cNvPr id="5" name="Foliennummernplatzhalter 4">
+            <a:extLst>
+              <a:ext uri="{FF2B5EF4-FFF2-40B4-BE49-F238E27FC236}">
+                <a16:creationId xmlns:a16="http://schemas.microsoft.com/office/drawing/2014/main" id="{D0881CE1-CCA8-4DEC-8FC0-62CE15DEA8A9}"/>
+              </a:ext>
+            </a:extLst>
+          </p:cNvPr>
+          <p:cNvSpPr>
+            <a:spLocks noGrp="1"/>
+          </p:cNvSpPr>
+          <p:nvPr>
+            <p:ph type="sldNum" sz="quarter" idx="12"/>
+          </p:nvPr>
+        </p:nvSpPr>
+        <p:spPr/>
+        <p:txBody>
+          <a:bodyPr/>
+          <a:lstStyle/>
+          <a:p>
+            <a:fld id="{F4DAF760-8A09-427D-9634-9AF01F07ABD5}" type="slidenum">
+              <a:rPr lang="de-DE" smtClean="0"/>
+              <a:pPr/>
+              <a:t>8</a:t>
+            </a:fld>
+            <a:endParaRPr lang="de-DE" dirty="0"/>
+          </a:p>
+        </p:txBody>
+      </p:sp>
+    </p:spTree>
+    <p:extLst>
+      <p:ext uri="{BB962C8B-B14F-4D97-AF65-F5344CB8AC3E}">
+        <p14:creationId xmlns:p14="http://schemas.microsoft.com/office/powerpoint/2010/main" val="907702840"/>
+      </p:ext>
+    </p:extLst>
+  </p:cSld>
+  <p:clrMapOvr>
+    <a:masterClrMapping/>
+  </p:clrMapOvr>
+</p:sld>
+</file>
+
+<file path=ppt/slides/slide9.xml><?xml version="1.0" encoding="utf-8"?>
+<p:sld xmlns:a="http://schemas.openxmlformats.org/drawingml/2006/main" xmlns:r="http://schemas.openxmlformats.org/officeDocument/2006/relationships" xmlns:p="http://schemas.openxmlformats.org/presentationml/2006/main">
+  <p:cSld>
+    <p:spTree>
+      <p:nvGrpSpPr>
+        <p:cNvPr id="1" name=""/>
+        <p:cNvGrpSpPr/>
+        <p:nvPr/>
+      </p:nvGrpSpPr>
+      <p:grpSpPr>
+        <a:xfrm>
+          <a:off x="0" y="0"/>
+          <a:ext cx="0" cy="0"/>
+          <a:chOff x="0" y="0"/>
+          <a:chExt cx="0" cy="0"/>
+        </a:xfrm>
+      </p:grpSpPr>
+      <p:sp>
+        <p:nvSpPr>
           <p:cNvPr id="2" name="Titel 1"/>
           <p:cNvSpPr>
             <a:spLocks noGrp="1"/>
@@ -3835,7 +6376,7 @@
           <a:p>
             <a:fld id="{F4DAF760-8A09-427D-9634-9AF01F07ABD5}" type="slidenum">
               <a:rPr lang="de-DE" smtClean="0"/>
-              <a:t>4</a:t>
+              <a:t>9</a:t>
             </a:fld>
             <a:endParaRPr lang="de-DE" dirty="0"/>
           </a:p>

</xml_diff>